<commit_message>
Update Data Exploration and Visualization with Tableau.pptx
updated powerpoint
</commit_message>
<xml_diff>
--- a/Data Exploration and Visualization with Tableau.pptx
+++ b/Data Exploration and Visualization with Tableau.pptx
@@ -5,7 +5,7 @@
     <p:sldMasterId id="2147483743" r:id="rId1"/>
   </p:sldMasterIdLst>
   <p:notesMasterIdLst>
-    <p:notesMasterId r:id="rId40"/>
+    <p:notesMasterId r:id="rId41"/>
   </p:notesMasterIdLst>
   <p:sldIdLst>
     <p:sldId id="256" r:id="rId2"/>
@@ -19,33 +19,34 @@
     <p:sldId id="263" r:id="rId10"/>
     <p:sldId id="265" r:id="rId11"/>
     <p:sldId id="264" r:id="rId12"/>
-    <p:sldId id="267" r:id="rId13"/>
-    <p:sldId id="268" r:id="rId14"/>
-    <p:sldId id="270" r:id="rId15"/>
-    <p:sldId id="269" r:id="rId16"/>
-    <p:sldId id="271" r:id="rId17"/>
-    <p:sldId id="272" r:id="rId18"/>
-    <p:sldId id="273" r:id="rId19"/>
-    <p:sldId id="276" r:id="rId20"/>
-    <p:sldId id="274" r:id="rId21"/>
-    <p:sldId id="277" r:id="rId22"/>
-    <p:sldId id="278" r:id="rId23"/>
-    <p:sldId id="279" r:id="rId24"/>
-    <p:sldId id="280" r:id="rId25"/>
-    <p:sldId id="281" r:id="rId26"/>
-    <p:sldId id="282" r:id="rId27"/>
-    <p:sldId id="283" r:id="rId28"/>
-    <p:sldId id="284" r:id="rId29"/>
-    <p:sldId id="286" r:id="rId30"/>
-    <p:sldId id="287" r:id="rId31"/>
-    <p:sldId id="288" r:id="rId32"/>
-    <p:sldId id="289" r:id="rId33"/>
-    <p:sldId id="290" r:id="rId34"/>
-    <p:sldId id="285" r:id="rId35"/>
-    <p:sldId id="294" r:id="rId36"/>
-    <p:sldId id="291" r:id="rId37"/>
-    <p:sldId id="292" r:id="rId38"/>
-    <p:sldId id="293" r:id="rId39"/>
+    <p:sldId id="295" r:id="rId13"/>
+    <p:sldId id="267" r:id="rId14"/>
+    <p:sldId id="268" r:id="rId15"/>
+    <p:sldId id="270" r:id="rId16"/>
+    <p:sldId id="269" r:id="rId17"/>
+    <p:sldId id="271" r:id="rId18"/>
+    <p:sldId id="272" r:id="rId19"/>
+    <p:sldId id="273" r:id="rId20"/>
+    <p:sldId id="276" r:id="rId21"/>
+    <p:sldId id="274" r:id="rId22"/>
+    <p:sldId id="277" r:id="rId23"/>
+    <p:sldId id="278" r:id="rId24"/>
+    <p:sldId id="279" r:id="rId25"/>
+    <p:sldId id="280" r:id="rId26"/>
+    <p:sldId id="281" r:id="rId27"/>
+    <p:sldId id="282" r:id="rId28"/>
+    <p:sldId id="283" r:id="rId29"/>
+    <p:sldId id="284" r:id="rId30"/>
+    <p:sldId id="286" r:id="rId31"/>
+    <p:sldId id="287" r:id="rId32"/>
+    <p:sldId id="288" r:id="rId33"/>
+    <p:sldId id="289" r:id="rId34"/>
+    <p:sldId id="290" r:id="rId35"/>
+    <p:sldId id="285" r:id="rId36"/>
+    <p:sldId id="294" r:id="rId37"/>
+    <p:sldId id="291" r:id="rId38"/>
+    <p:sldId id="292" r:id="rId39"/>
+    <p:sldId id="293" r:id="rId40"/>
   </p:sldIdLst>
   <p:sldSz cx="12192000" cy="6858000"/>
   <p:notesSz cx="6858000" cy="9144000"/>
@@ -545,29 +546,8 @@
           <a:bodyPr/>
           <a:lstStyle/>
           <a:p>
-            <a:r>
-              <a:rPr lang="en-US" dirty="0"/>
-              <a:t>Show the worksheet builder</a:t>
-            </a:r>
-          </a:p>
-          <a:p>
             <a:endParaRPr lang="en-US" dirty="0"/>
           </a:p>
-          <a:p>
-            <a:r>
-              <a:rPr lang="en-US" dirty="0"/>
-              <a:t>DEMO: Histogram</a:t>
-            </a:r>
-          </a:p>
-          <a:p>
-            <a:endParaRPr lang="en-US" dirty="0"/>
-          </a:p>
-          <a:p>
-            <a:r>
-              <a:rPr lang="en-US" dirty="0"/>
-              <a:t>DEMO: Heatmap</a:t>
-            </a:r>
-          </a:p>
         </p:txBody>
       </p:sp>
       <p:sp>
@@ -577,7 +557,7 @@
             <a:spLocks noGrp="1"/>
           </p:cNvSpPr>
           <p:nvPr>
-            <p:ph type="sldNum" sz="quarter" idx="5"/>
+            <p:ph type="sldNum" sz="quarter" idx="10"/>
           </p:nvPr>
         </p:nvSpPr>
         <p:spPr/>
@@ -587,7 +567,7 @@
           <a:p>
             <a:fld id="{9D406E13-0E4F-455D-9BF0-ACB6009E0B58}" type="slidenum">
               <a:rPr lang="en-US" smtClean="0"/>
-              <a:t>20</a:t>
+              <a:t>12</a:t>
             </a:fld>
             <a:endParaRPr lang="en-US"/>
           </a:p>
@@ -596,7 +576,7 @@
     </p:spTree>
     <p:extLst>
       <p:ext uri="{BB962C8B-B14F-4D97-AF65-F5344CB8AC3E}">
-        <p14:creationId xmlns:p14="http://schemas.microsoft.com/office/powerpoint/2010/main" val="294784427"/>
+        <p14:creationId xmlns:p14="http://schemas.microsoft.com/office/powerpoint/2010/main" val="3741468149"/>
       </p:ext>
     </p:extLst>
   </p:cSld>
@@ -651,10 +631,27 @@
           <a:lstStyle/>
           <a:p>
             <a:r>
-              <a:rPr lang="en-US"/>
-              <a:t>CLEAR PLAN</a:t>
-            </a:r>
+              <a:rPr lang="en-US" dirty="0"/>
+              <a:t>Show the worksheet builder</a:t>
+            </a:r>
+          </a:p>
+          <a:p>
             <a:endParaRPr lang="en-US" dirty="0"/>
+          </a:p>
+          <a:p>
+            <a:r>
+              <a:rPr lang="en-US" dirty="0"/>
+              <a:t>DEMO: Histogram</a:t>
+            </a:r>
+          </a:p>
+          <a:p>
+            <a:endParaRPr lang="en-US" dirty="0"/>
+          </a:p>
+          <a:p>
+            <a:r>
+              <a:rPr lang="en-US" dirty="0"/>
+              <a:t>DEMO: Heatmap</a:t>
+            </a:r>
           </a:p>
         </p:txBody>
       </p:sp>
@@ -684,7 +681,7 @@
     </p:spTree>
     <p:extLst>
       <p:ext uri="{BB962C8B-B14F-4D97-AF65-F5344CB8AC3E}">
-        <p14:creationId xmlns:p14="http://schemas.microsoft.com/office/powerpoint/2010/main" val="531975461"/>
+        <p14:creationId xmlns:p14="http://schemas.microsoft.com/office/powerpoint/2010/main" val="294784427"/>
       </p:ext>
     </p:extLst>
   </p:cSld>
@@ -738,6 +735,10 @@
           <a:bodyPr/>
           <a:lstStyle/>
           <a:p>
+            <a:r>
+              <a:rPr lang="en-US"/>
+              <a:t>CLEAR PLAN</a:t>
+            </a:r>
             <a:endParaRPr lang="en-US" dirty="0"/>
           </a:p>
         </p:txBody>
@@ -759,7 +760,7 @@
           <a:p>
             <a:fld id="{9D406E13-0E4F-455D-9BF0-ACB6009E0B58}" type="slidenum">
               <a:rPr lang="en-US" smtClean="0"/>
-              <a:t>24</a:t>
+              <a:t>22</a:t>
             </a:fld>
             <a:endParaRPr lang="en-US"/>
           </a:p>
@@ -768,7 +769,7 @@
     </p:spTree>
     <p:extLst>
       <p:ext uri="{BB962C8B-B14F-4D97-AF65-F5344CB8AC3E}">
-        <p14:creationId xmlns:p14="http://schemas.microsoft.com/office/powerpoint/2010/main" val="910507859"/>
+        <p14:creationId xmlns:p14="http://schemas.microsoft.com/office/powerpoint/2010/main" val="531975461"/>
       </p:ext>
     </p:extLst>
   </p:cSld>
@@ -852,7 +853,7 @@
     </p:spTree>
     <p:extLst>
       <p:ext uri="{BB962C8B-B14F-4D97-AF65-F5344CB8AC3E}">
-        <p14:creationId xmlns:p14="http://schemas.microsoft.com/office/powerpoint/2010/main" val="3913549595"/>
+        <p14:creationId xmlns:p14="http://schemas.microsoft.com/office/powerpoint/2010/main" val="910507859"/>
       </p:ext>
     </p:extLst>
   </p:cSld>
@@ -936,7 +937,7 @@
     </p:spTree>
     <p:extLst>
       <p:ext uri="{BB962C8B-B14F-4D97-AF65-F5344CB8AC3E}">
-        <p14:creationId xmlns:p14="http://schemas.microsoft.com/office/powerpoint/2010/main" val="4010792174"/>
+        <p14:creationId xmlns:p14="http://schemas.microsoft.com/office/powerpoint/2010/main" val="3913549595"/>
       </p:ext>
     </p:extLst>
   </p:cSld>
@@ -1020,7 +1021,7 @@
     </p:spTree>
     <p:extLst>
       <p:ext uri="{BB962C8B-B14F-4D97-AF65-F5344CB8AC3E}">
-        <p14:creationId xmlns:p14="http://schemas.microsoft.com/office/powerpoint/2010/main" val="772218186"/>
+        <p14:creationId xmlns:p14="http://schemas.microsoft.com/office/powerpoint/2010/main" val="4010792174"/>
       </p:ext>
     </p:extLst>
   </p:cSld>
@@ -1095,7 +1096,7 @@
           <a:p>
             <a:fld id="{9D406E13-0E4F-455D-9BF0-ACB6009E0B58}" type="slidenum">
               <a:rPr lang="en-US" smtClean="0"/>
-              <a:t>31</a:t>
+              <a:t>28</a:t>
             </a:fld>
             <a:endParaRPr lang="en-US"/>
           </a:p>
@@ -1104,7 +1105,7 @@
     </p:spTree>
     <p:extLst>
       <p:ext uri="{BB962C8B-B14F-4D97-AF65-F5344CB8AC3E}">
-        <p14:creationId xmlns:p14="http://schemas.microsoft.com/office/powerpoint/2010/main" val="2636904647"/>
+        <p14:creationId xmlns:p14="http://schemas.microsoft.com/office/powerpoint/2010/main" val="772218186"/>
       </p:ext>
     </p:extLst>
   </p:cSld>
@@ -1179,7 +1180,91 @@
           <a:p>
             <a:fld id="{9D406E13-0E4F-455D-9BF0-ACB6009E0B58}" type="slidenum">
               <a:rPr lang="en-US" smtClean="0"/>
-              <a:t>37</a:t>
+              <a:t>32</a:t>
+            </a:fld>
+            <a:endParaRPr lang="en-US"/>
+          </a:p>
+        </p:txBody>
+      </p:sp>
+    </p:spTree>
+    <p:extLst>
+      <p:ext uri="{BB962C8B-B14F-4D97-AF65-F5344CB8AC3E}">
+        <p14:creationId xmlns:p14="http://schemas.microsoft.com/office/powerpoint/2010/main" val="2636904647"/>
+      </p:ext>
+    </p:extLst>
+  </p:cSld>
+  <p:clrMapOvr>
+    <a:masterClrMapping/>
+  </p:clrMapOvr>
+</p:notes>
+</file>
+
+<file path=ppt/notesSlides/notesSlide9.xml><?xml version="1.0" encoding="utf-8"?>
+<p:notes xmlns:a="http://schemas.openxmlformats.org/drawingml/2006/main" xmlns:r="http://schemas.openxmlformats.org/officeDocument/2006/relationships" xmlns:p="http://schemas.openxmlformats.org/presentationml/2006/main">
+  <p:cSld>
+    <p:spTree>
+      <p:nvGrpSpPr>
+        <p:cNvPr id="1" name=""/>
+        <p:cNvGrpSpPr/>
+        <p:nvPr/>
+      </p:nvGrpSpPr>
+      <p:grpSpPr>
+        <a:xfrm>
+          <a:off x="0" y="0"/>
+          <a:ext cx="0" cy="0"/>
+          <a:chOff x="0" y="0"/>
+          <a:chExt cx="0" cy="0"/>
+        </a:xfrm>
+      </p:grpSpPr>
+      <p:sp>
+        <p:nvSpPr>
+          <p:cNvPr id="2" name="Slide Image Placeholder 1"/>
+          <p:cNvSpPr>
+            <a:spLocks noGrp="1" noRot="1" noChangeAspect="1"/>
+          </p:cNvSpPr>
+          <p:nvPr>
+            <p:ph type="sldImg"/>
+          </p:nvPr>
+        </p:nvSpPr>
+        <p:spPr/>
+      </p:sp>
+      <p:sp>
+        <p:nvSpPr>
+          <p:cNvPr id="3" name="Notes Placeholder 2"/>
+          <p:cNvSpPr>
+            <a:spLocks noGrp="1"/>
+          </p:cNvSpPr>
+          <p:nvPr>
+            <p:ph type="body" idx="1"/>
+          </p:nvPr>
+        </p:nvSpPr>
+        <p:spPr/>
+        <p:txBody>
+          <a:bodyPr/>
+          <a:lstStyle/>
+          <a:p>
+            <a:endParaRPr lang="en-US" dirty="0"/>
+          </a:p>
+        </p:txBody>
+      </p:sp>
+      <p:sp>
+        <p:nvSpPr>
+          <p:cNvPr id="4" name="Slide Number Placeholder 3"/>
+          <p:cNvSpPr>
+            <a:spLocks noGrp="1"/>
+          </p:cNvSpPr>
+          <p:nvPr>
+            <p:ph type="sldNum" sz="quarter" idx="5"/>
+          </p:nvPr>
+        </p:nvSpPr>
+        <p:spPr/>
+        <p:txBody>
+          <a:bodyPr/>
+          <a:lstStyle/>
+          <a:p>
+            <a:fld id="{9D406E13-0E4F-455D-9BF0-ACB6009E0B58}" type="slidenum">
+              <a:rPr lang="en-US" smtClean="0"/>
+              <a:t>38</a:t>
             </a:fld>
             <a:endParaRPr lang="en-US"/>
           </a:p>
@@ -5175,6 +5260,13 @@
   <p:clrMapOvr>
     <a:masterClrMapping/>
   </p:clrMapOvr>
+  <p:timing>
+    <p:tnLst>
+      <p:par>
+        <p:cTn id="1" dur="indefinite" restart="never" nodeType="tmRoot"/>
+      </p:par>
+    </p:tnLst>
+  </p:timing>
 </p:sld>
 </file>
 
@@ -5211,8 +5303,102 @@
           <a:lstStyle/>
           <a:p>
             <a:r>
+              <a:rPr lang="en-US" b="1" dirty="0" smtClean="0"/>
+              <a:t>DEMO: </a:t>
+            </a:r>
+            <a:br>
+              <a:rPr lang="en-US" b="1" dirty="0" smtClean="0"/>
+            </a:br>
+            <a:r>
+              <a:rPr lang="en-US" b="1" dirty="0" smtClean="0"/>
+              <a:t>Interfacing with the interface</a:t>
+            </a:r>
+            <a:endParaRPr lang="en-US" b="1" dirty="0"/>
+          </a:p>
+        </p:txBody>
+      </p:sp>
+      <p:sp>
+        <p:nvSpPr>
+          <p:cNvPr id="4" name="Text Placeholder 3"/>
+          <p:cNvSpPr>
+            <a:spLocks noGrp="1"/>
+          </p:cNvSpPr>
+          <p:nvPr>
+            <p:ph type="body" idx="1"/>
+          </p:nvPr>
+        </p:nvSpPr>
+        <p:spPr/>
+        <p:txBody>
+          <a:bodyPr/>
+          <a:lstStyle/>
+          <a:p>
+            <a:endParaRPr lang="en-US"/>
+          </a:p>
+        </p:txBody>
+      </p:sp>
+    </p:spTree>
+    <p:extLst>
+      <p:ext uri="{BB962C8B-B14F-4D97-AF65-F5344CB8AC3E}">
+        <p14:creationId xmlns:p14="http://schemas.microsoft.com/office/powerpoint/2010/main" val="2333419758"/>
+      </p:ext>
+    </p:extLst>
+  </p:cSld>
+  <p:clrMapOvr>
+    <a:masterClrMapping/>
+  </p:clrMapOvr>
+  <p:timing>
+    <p:tnLst>
+      <p:par>
+        <p:cTn id="1" dur="indefinite" restart="never" nodeType="tmRoot"/>
+      </p:par>
+    </p:tnLst>
+  </p:timing>
+</p:sld>
+</file>
+
+<file path=ppt/slides/slide13.xml><?xml version="1.0" encoding="utf-8"?>
+<p:sld xmlns:a="http://schemas.openxmlformats.org/drawingml/2006/main" xmlns:r="http://schemas.openxmlformats.org/officeDocument/2006/relationships" xmlns:p="http://schemas.openxmlformats.org/presentationml/2006/main">
+  <p:cSld>
+    <p:spTree>
+      <p:nvGrpSpPr>
+        <p:cNvPr id="1" name=""/>
+        <p:cNvGrpSpPr/>
+        <p:nvPr/>
+      </p:nvGrpSpPr>
+      <p:grpSpPr>
+        <a:xfrm>
+          <a:off x="0" y="0"/>
+          <a:ext cx="0" cy="0"/>
+          <a:chOff x="0" y="0"/>
+          <a:chExt cx="0" cy="0"/>
+        </a:xfrm>
+      </p:grpSpPr>
+      <p:sp>
+        <p:nvSpPr>
+          <p:cNvPr id="2" name="Title 1"/>
+          <p:cNvSpPr>
+            <a:spLocks noGrp="1"/>
+          </p:cNvSpPr>
+          <p:nvPr>
+            <p:ph type="title"/>
+          </p:nvPr>
+        </p:nvSpPr>
+        <p:spPr/>
+        <p:txBody>
+          <a:bodyPr/>
+          <a:lstStyle/>
+          <a:p>
+            <a:r>
               <a:rPr lang="en-US" b="1" dirty="0"/>
-              <a:t>EXERCISE: Connect to your data (5 mins)</a:t>
+              <a:t>EXERCISE: Connect to your data </a:t>
+            </a:r>
+            <a:r>
+              <a:rPr lang="en-US" b="1" dirty="0" smtClean="0"/>
+              <a:t>(5 </a:t>
+            </a:r>
+            <a:r>
+              <a:rPr lang="en-US" b="1" dirty="0"/>
+              <a:t>mins)</a:t>
             </a:r>
           </a:p>
         </p:txBody>
@@ -5507,10 +5693,17 @@
   <p:clrMapOvr>
     <a:masterClrMapping/>
   </p:clrMapOvr>
+  <p:timing>
+    <p:tnLst>
+      <p:par>
+        <p:cTn id="1" dur="indefinite" restart="never" nodeType="tmRoot"/>
+      </p:par>
+    </p:tnLst>
+  </p:timing>
 </p:sld>
 </file>
 
-<file path=ppt/slides/slide13.xml><?xml version="1.0" encoding="utf-8"?>
+<file path=ppt/slides/slide14.xml><?xml version="1.0" encoding="utf-8"?>
 <p:sld xmlns:a="http://schemas.openxmlformats.org/drawingml/2006/main" xmlns:r="http://schemas.openxmlformats.org/officeDocument/2006/relationships" xmlns:p="http://schemas.openxmlformats.org/presentationml/2006/main">
   <p:cSld>
     <p:spTree>
@@ -5618,7 +5811,7 @@
 </p:sld>
 </file>
 
-<file path=ppt/slides/slide14.xml><?xml version="1.0" encoding="utf-8"?>
+<file path=ppt/slides/slide15.xml><?xml version="1.0" encoding="utf-8"?>
 <p:sld xmlns:a="http://schemas.openxmlformats.org/drawingml/2006/main" xmlns:r="http://schemas.openxmlformats.org/officeDocument/2006/relationships" xmlns:p="http://schemas.openxmlformats.org/presentationml/2006/main">
   <p:cSld>
     <p:spTree>
@@ -5817,7 +6010,7 @@
 </p:sld>
 </file>
 
-<file path=ppt/slides/slide15.xml><?xml version="1.0" encoding="utf-8"?>
+<file path=ppt/slides/slide16.xml><?xml version="1.0" encoding="utf-8"?>
 <p:sld xmlns:a="http://schemas.openxmlformats.org/drawingml/2006/main" xmlns:r="http://schemas.openxmlformats.org/officeDocument/2006/relationships" xmlns:p="http://schemas.openxmlformats.org/presentationml/2006/main">
   <p:cSld>
     <p:spTree>
@@ -6033,7 +6226,7 @@
 </p:sld>
 </file>
 
-<file path=ppt/slides/slide16.xml><?xml version="1.0" encoding="utf-8"?>
+<file path=ppt/slides/slide17.xml><?xml version="1.0" encoding="utf-8"?>
 <p:sld xmlns:a="http://schemas.openxmlformats.org/drawingml/2006/main" xmlns:r="http://schemas.openxmlformats.org/officeDocument/2006/relationships" xmlns:p="http://schemas.openxmlformats.org/presentationml/2006/main">
   <p:cSld>
     <p:spTree>
@@ -6067,7 +6260,15 @@
           <a:p>
             <a:r>
               <a:rPr lang="en-US" b="1" dirty="0"/>
-              <a:t>EXERCISE: “Build” our Dataset (5 mins)</a:t>
+              <a:t>EXERCISE: “Build” our Dataset </a:t>
+            </a:r>
+            <a:r>
+              <a:rPr lang="en-US" b="1" dirty="0" smtClean="0"/>
+              <a:t>(5 </a:t>
+            </a:r>
+            <a:r>
+              <a:rPr lang="en-US" b="1" dirty="0"/>
+              <a:t>mins)</a:t>
             </a:r>
           </a:p>
         </p:txBody>
@@ -6271,7 +6472,7 @@
 </p:sld>
 </file>
 
-<file path=ppt/slides/slide17.xml><?xml version="1.0" encoding="utf-8"?>
+<file path=ppt/slides/slide18.xml><?xml version="1.0" encoding="utf-8"?>
 <p:sld xmlns:a="http://schemas.openxmlformats.org/drawingml/2006/main" xmlns:r="http://schemas.openxmlformats.org/officeDocument/2006/relationships" xmlns:p="http://schemas.openxmlformats.org/presentationml/2006/main">
   <p:cSld>
     <p:spTree>
@@ -7029,6 +7230,153 @@
                       </p:childTnLst>
                     </p:cTn>
                   </p:par>
+                  <p:par>
+                    <p:cTn id="39" fill="hold">
+                      <p:stCondLst>
+                        <p:cond delay="indefinite"/>
+                      </p:stCondLst>
+                      <p:childTnLst>
+                        <p:par>
+                          <p:cTn id="40" fill="hold">
+                            <p:stCondLst>
+                              <p:cond delay="0"/>
+                            </p:stCondLst>
+                            <p:childTnLst>
+                              <p:par>
+                                <p:cTn id="41" presetID="10" presetClass="entr" presetSubtype="0" fill="hold" nodeType="clickEffect">
+                                  <p:stCondLst>
+                                    <p:cond delay="0"/>
+                                  </p:stCondLst>
+                                  <p:childTnLst>
+                                    <p:set>
+                                      <p:cBhvr>
+                                        <p:cTn id="42" dur="1" fill="hold">
+                                          <p:stCondLst>
+                                            <p:cond delay="0"/>
+                                          </p:stCondLst>
+                                        </p:cTn>
+                                        <p:tgtEl>
+                                          <p:spTgt spid="3">
+                                            <p:txEl>
+                                              <p:pRg st="5" end="5"/>
+                                            </p:txEl>
+                                          </p:spTgt>
+                                        </p:tgtEl>
+                                        <p:attrNameLst>
+                                          <p:attrName>style.visibility</p:attrName>
+                                        </p:attrNameLst>
+                                      </p:cBhvr>
+                                      <p:to>
+                                        <p:strVal val="visible"/>
+                                      </p:to>
+                                    </p:set>
+                                    <p:animEffect transition="in" filter="fade">
+                                      <p:cBhvr>
+                                        <p:cTn id="43" dur="500"/>
+                                        <p:tgtEl>
+                                          <p:spTgt spid="3">
+                                            <p:txEl>
+                                              <p:pRg st="5" end="5"/>
+                                            </p:txEl>
+                                          </p:spTgt>
+                                        </p:tgtEl>
+                                      </p:cBhvr>
+                                    </p:animEffect>
+                                  </p:childTnLst>
+                                </p:cTn>
+                              </p:par>
+                              <p:par>
+                                <p:cTn id="44" presetID="10" presetClass="entr" presetSubtype="0" fill="hold" nodeType="withEffect">
+                                  <p:stCondLst>
+                                    <p:cond delay="0"/>
+                                  </p:stCondLst>
+                                  <p:childTnLst>
+                                    <p:set>
+                                      <p:cBhvr>
+                                        <p:cTn id="45" dur="1" fill="hold">
+                                          <p:stCondLst>
+                                            <p:cond delay="0"/>
+                                          </p:stCondLst>
+                                        </p:cTn>
+                                        <p:tgtEl>
+                                          <p:spTgt spid="3">
+                                            <p:txEl>
+                                              <p:pRg st="6" end="6"/>
+                                            </p:txEl>
+                                          </p:spTgt>
+                                        </p:tgtEl>
+                                        <p:attrNameLst>
+                                          <p:attrName>style.visibility</p:attrName>
+                                        </p:attrNameLst>
+                                      </p:cBhvr>
+                                      <p:to>
+                                        <p:strVal val="visible"/>
+                                      </p:to>
+                                    </p:set>
+                                    <p:animEffect transition="in" filter="fade">
+                                      <p:cBhvr>
+                                        <p:cTn id="46" dur="500"/>
+                                        <p:tgtEl>
+                                          <p:spTgt spid="3">
+                                            <p:txEl>
+                                              <p:pRg st="6" end="6"/>
+                                            </p:txEl>
+                                          </p:spTgt>
+                                        </p:tgtEl>
+                                      </p:cBhvr>
+                                    </p:animEffect>
+                                  </p:childTnLst>
+                                </p:cTn>
+                              </p:par>
+                              <p:par>
+                                <p:cTn id="47" presetID="10" presetClass="entr" presetSubtype="0" fill="hold" nodeType="withEffect">
+                                  <p:stCondLst>
+                                    <p:cond delay="0"/>
+                                  </p:stCondLst>
+                                  <p:childTnLst>
+                                    <p:set>
+                                      <p:cBhvr>
+                                        <p:cTn id="48" dur="1" fill="hold">
+                                          <p:stCondLst>
+                                            <p:cond delay="0"/>
+                                          </p:stCondLst>
+                                        </p:cTn>
+                                        <p:tgtEl>
+                                          <p:spTgt spid="3">
+                                            <p:txEl>
+                                              <p:pRg st="7" end="7"/>
+                                            </p:txEl>
+                                          </p:spTgt>
+                                        </p:tgtEl>
+                                        <p:attrNameLst>
+                                          <p:attrName>style.visibility</p:attrName>
+                                        </p:attrNameLst>
+                                      </p:cBhvr>
+                                      <p:to>
+                                        <p:strVal val="visible"/>
+                                      </p:to>
+                                    </p:set>
+                                    <p:animEffect transition="in" filter="fade">
+                                      <p:cBhvr>
+                                        <p:cTn id="49" dur="500"/>
+                                        <p:tgtEl>
+                                          <p:spTgt spid="3">
+                                            <p:txEl>
+                                              <p:pRg st="7" end="7"/>
+                                            </p:txEl>
+                                          </p:spTgt>
+                                        </p:tgtEl>
+                                      </p:cBhvr>
+                                    </p:animEffect>
+                                  </p:childTnLst>
+                                </p:cTn>
+                              </p:par>
+                            </p:childTnLst>
+                          </p:cTn>
+                        </p:par>
+                      </p:childTnLst>
+                    </p:cTn>
+                  </p:par>
                 </p:childTnLst>
               </p:cTn>
               <p:prevCondLst>
@@ -7057,7 +7405,7 @@
 </p:sld>
 </file>
 
-<file path=ppt/slides/slide18.xml><?xml version="1.0" encoding="utf-8"?>
+<file path=ppt/slides/slide19.xml><?xml version="1.0" encoding="utf-8"?>
 <p:sld xmlns:a="http://schemas.openxmlformats.org/drawingml/2006/main" xmlns:r="http://schemas.openxmlformats.org/officeDocument/2006/relationships" xmlns:p="http://schemas.openxmlformats.org/presentationml/2006/main">
   <p:cSld>
     <p:spTree>
@@ -7120,8 +7468,12 @@
           <a:lstStyle/>
           <a:p>
             <a:r>
+              <a:rPr lang="en-US" dirty="0" smtClean="0"/>
+              <a:t>10 </a:t>
+            </a:r>
+            <a:r>
               <a:rPr lang="en-US" dirty="0"/>
-              <a:t>10 minutes</a:t>
+              <a:t>minutes</a:t>
             </a:r>
           </a:p>
         </p:txBody>
@@ -7136,10 +7488,150 @@
   <p:clrMapOvr>
     <a:masterClrMapping/>
   </p:clrMapOvr>
+  <p:timing>
+    <p:tnLst>
+      <p:par>
+        <p:cTn id="1" dur="indefinite" restart="never" nodeType="tmRoot"/>
+      </p:par>
+    </p:tnLst>
+  </p:timing>
 </p:sld>
 </file>
 
-<file path=ppt/slides/slide19.xml><?xml version="1.0" encoding="utf-8"?>
+<file path=ppt/slides/slide2.xml><?xml version="1.0" encoding="utf-8"?>
+<p:sld xmlns:a="http://schemas.openxmlformats.org/drawingml/2006/main" xmlns:r="http://schemas.openxmlformats.org/officeDocument/2006/relationships" xmlns:p="http://schemas.openxmlformats.org/presentationml/2006/main">
+  <p:cSld>
+    <p:spTree>
+      <p:nvGrpSpPr>
+        <p:cNvPr id="1" name=""/>
+        <p:cNvGrpSpPr/>
+        <p:nvPr/>
+      </p:nvGrpSpPr>
+      <p:grpSpPr>
+        <a:xfrm>
+          <a:off x="0" y="0"/>
+          <a:ext cx="0" cy="0"/>
+          <a:chOff x="0" y="0"/>
+          <a:chExt cx="0" cy="0"/>
+        </a:xfrm>
+      </p:grpSpPr>
+      <p:sp>
+        <p:nvSpPr>
+          <p:cNvPr id="2" name="Title 1"/>
+          <p:cNvSpPr>
+            <a:spLocks noGrp="1"/>
+          </p:cNvSpPr>
+          <p:nvPr>
+            <p:ph type="title"/>
+          </p:nvPr>
+        </p:nvSpPr>
+        <p:spPr/>
+        <p:txBody>
+          <a:bodyPr/>
+          <a:lstStyle/>
+          <a:p>
+            <a:r>
+              <a:rPr lang="en-US" dirty="0"/>
+              <a:t>Roadmap for Today</a:t>
+            </a:r>
+          </a:p>
+        </p:txBody>
+      </p:sp>
+      <p:sp>
+        <p:nvSpPr>
+          <p:cNvPr id="3" name="Content Placeholder 2"/>
+          <p:cNvSpPr>
+            <a:spLocks noGrp="1"/>
+          </p:cNvSpPr>
+          <p:nvPr>
+            <p:ph idx="1"/>
+          </p:nvPr>
+        </p:nvSpPr>
+        <p:spPr/>
+        <p:txBody>
+          <a:bodyPr>
+            <a:normAutofit lnSpcReduction="10000"/>
+          </a:bodyPr>
+          <a:lstStyle/>
+          <a:p>
+            <a:r>
+              <a:rPr lang="en-US" dirty="0"/>
+              <a:t>Introductions</a:t>
+            </a:r>
+          </a:p>
+          <a:p>
+            <a:r>
+              <a:rPr lang="en-US" dirty="0"/>
+              <a:t>Getting your Data</a:t>
+            </a:r>
+          </a:p>
+          <a:p>
+            <a:r>
+              <a:rPr lang="en-US" dirty="0"/>
+              <a:t>Building your Dataset</a:t>
+            </a:r>
+          </a:p>
+          <a:p>
+            <a:r>
+              <a:rPr lang="en-US" dirty="0"/>
+              <a:t>EDA/Configuration</a:t>
+            </a:r>
+          </a:p>
+          <a:p>
+            <a:r>
+              <a:rPr lang="en-US" dirty="0"/>
+              <a:t>Tableau Elements</a:t>
+            </a:r>
+          </a:p>
+          <a:p>
+            <a:pPr lvl="1"/>
+            <a:r>
+              <a:rPr lang="en-US" dirty="0"/>
+              <a:t>Worksheets</a:t>
+            </a:r>
+          </a:p>
+          <a:p>
+            <a:pPr lvl="1"/>
+            <a:r>
+              <a:rPr lang="en-US" dirty="0"/>
+              <a:t>Dashboards</a:t>
+            </a:r>
+          </a:p>
+          <a:p>
+            <a:pPr lvl="1"/>
+            <a:r>
+              <a:rPr lang="en-US" dirty="0"/>
+              <a:t>Stories</a:t>
+            </a:r>
+          </a:p>
+          <a:p>
+            <a:r>
+              <a:rPr lang="en-US" dirty="0"/>
+              <a:t>Licenses/Publishing</a:t>
+            </a:r>
+          </a:p>
+          <a:p>
+            <a:r>
+              <a:rPr lang="en-US" dirty="0"/>
+              <a:t>Additional Concepts</a:t>
+            </a:r>
+          </a:p>
+        </p:txBody>
+      </p:sp>
+    </p:spTree>
+    <p:extLst>
+      <p:ext uri="{BB962C8B-B14F-4D97-AF65-F5344CB8AC3E}">
+        <p14:creationId xmlns:p14="http://schemas.microsoft.com/office/powerpoint/2010/main" val="3113053241"/>
+      </p:ext>
+    </p:extLst>
+  </p:cSld>
+  <p:clrMapOvr>
+    <a:masterClrMapping/>
+  </p:clrMapOvr>
+</p:sld>
+</file>
+
+<file path=ppt/slides/slide20.xml><?xml version="1.0" encoding="utf-8"?>
 <p:sld xmlns:a="http://schemas.openxmlformats.org/drawingml/2006/main" xmlns:r="http://schemas.openxmlformats.org/officeDocument/2006/relationships" xmlns:p="http://schemas.openxmlformats.org/presentationml/2006/main">
   <p:cSld>
     <p:spTree>
@@ -8006,140 +8498,7 @@
 </p:sld>
 </file>
 
-<file path=ppt/slides/slide2.xml><?xml version="1.0" encoding="utf-8"?>
-<p:sld xmlns:a="http://schemas.openxmlformats.org/drawingml/2006/main" xmlns:r="http://schemas.openxmlformats.org/officeDocument/2006/relationships" xmlns:p="http://schemas.openxmlformats.org/presentationml/2006/main">
-  <p:cSld>
-    <p:spTree>
-      <p:nvGrpSpPr>
-        <p:cNvPr id="1" name=""/>
-        <p:cNvGrpSpPr/>
-        <p:nvPr/>
-      </p:nvGrpSpPr>
-      <p:grpSpPr>
-        <a:xfrm>
-          <a:off x="0" y="0"/>
-          <a:ext cx="0" cy="0"/>
-          <a:chOff x="0" y="0"/>
-          <a:chExt cx="0" cy="0"/>
-        </a:xfrm>
-      </p:grpSpPr>
-      <p:sp>
-        <p:nvSpPr>
-          <p:cNvPr id="2" name="Title 1"/>
-          <p:cNvSpPr>
-            <a:spLocks noGrp="1"/>
-          </p:cNvSpPr>
-          <p:nvPr>
-            <p:ph type="title"/>
-          </p:nvPr>
-        </p:nvSpPr>
-        <p:spPr/>
-        <p:txBody>
-          <a:bodyPr/>
-          <a:lstStyle/>
-          <a:p>
-            <a:r>
-              <a:rPr lang="en-US" dirty="0"/>
-              <a:t>Roadmap for Today</a:t>
-            </a:r>
-          </a:p>
-        </p:txBody>
-      </p:sp>
-      <p:sp>
-        <p:nvSpPr>
-          <p:cNvPr id="3" name="Content Placeholder 2"/>
-          <p:cNvSpPr>
-            <a:spLocks noGrp="1"/>
-          </p:cNvSpPr>
-          <p:nvPr>
-            <p:ph idx="1"/>
-          </p:nvPr>
-        </p:nvSpPr>
-        <p:spPr/>
-        <p:txBody>
-          <a:bodyPr>
-            <a:normAutofit lnSpcReduction="10000"/>
-          </a:bodyPr>
-          <a:lstStyle/>
-          <a:p>
-            <a:r>
-              <a:rPr lang="en-US" dirty="0"/>
-              <a:t>Introductions</a:t>
-            </a:r>
-          </a:p>
-          <a:p>
-            <a:r>
-              <a:rPr lang="en-US" dirty="0"/>
-              <a:t>Getting your Data</a:t>
-            </a:r>
-          </a:p>
-          <a:p>
-            <a:r>
-              <a:rPr lang="en-US" dirty="0"/>
-              <a:t>Building your Dataset</a:t>
-            </a:r>
-          </a:p>
-          <a:p>
-            <a:r>
-              <a:rPr lang="en-US" dirty="0"/>
-              <a:t>EDA/Configuration</a:t>
-            </a:r>
-          </a:p>
-          <a:p>
-            <a:r>
-              <a:rPr lang="en-US" dirty="0"/>
-              <a:t>Tableau Elements</a:t>
-            </a:r>
-          </a:p>
-          <a:p>
-            <a:pPr lvl="1"/>
-            <a:r>
-              <a:rPr lang="en-US" dirty="0"/>
-              <a:t>Worksheets</a:t>
-            </a:r>
-          </a:p>
-          <a:p>
-            <a:pPr lvl="1"/>
-            <a:r>
-              <a:rPr lang="en-US" dirty="0"/>
-              <a:t>Dashboards</a:t>
-            </a:r>
-          </a:p>
-          <a:p>
-            <a:pPr lvl="1"/>
-            <a:r>
-              <a:rPr lang="en-US" dirty="0"/>
-              <a:t>Stories</a:t>
-            </a:r>
-          </a:p>
-          <a:p>
-            <a:r>
-              <a:rPr lang="en-US" dirty="0"/>
-              <a:t>Licenses/Publishing</a:t>
-            </a:r>
-          </a:p>
-          <a:p>
-            <a:r>
-              <a:rPr lang="en-US" dirty="0"/>
-              <a:t>Additional Concepts</a:t>
-            </a:r>
-          </a:p>
-        </p:txBody>
-      </p:sp>
-    </p:spTree>
-    <p:extLst>
-      <p:ext uri="{BB962C8B-B14F-4D97-AF65-F5344CB8AC3E}">
-        <p14:creationId xmlns:p14="http://schemas.microsoft.com/office/powerpoint/2010/main" val="3113053241"/>
-      </p:ext>
-    </p:extLst>
-  </p:cSld>
-  <p:clrMapOvr>
-    <a:masterClrMapping/>
-  </p:clrMapOvr>
-</p:sld>
-</file>
-
-<file path=ppt/slides/slide20.xml><?xml version="1.0" encoding="utf-8"?>
+<file path=ppt/slides/slide21.xml><?xml version="1.0" encoding="utf-8"?>
 <p:sld xmlns:a="http://schemas.openxmlformats.org/drawingml/2006/main" xmlns:r="http://schemas.openxmlformats.org/officeDocument/2006/relationships" xmlns:p="http://schemas.openxmlformats.org/presentationml/2006/main">
   <p:cSld>
     <p:spTree>
@@ -8880,89 +9239,13 @@
   <p:clrMapOvr>
     <a:masterClrMapping/>
   </p:clrMapOvr>
-</p:sld>
-</file>
-
-<file path=ppt/slides/slide21.xml><?xml version="1.0" encoding="utf-8"?>
-<p:sld xmlns:a="http://schemas.openxmlformats.org/drawingml/2006/main" xmlns:r="http://schemas.openxmlformats.org/officeDocument/2006/relationships" xmlns:p="http://schemas.openxmlformats.org/presentationml/2006/main">
-  <p:cSld>
-    <p:spTree>
-      <p:nvGrpSpPr>
-        <p:cNvPr id="1" name=""/>
-        <p:cNvGrpSpPr/>
-        <p:nvPr/>
-      </p:nvGrpSpPr>
-      <p:grpSpPr>
-        <a:xfrm>
-          <a:off x="0" y="0"/>
-          <a:ext cx="0" cy="0"/>
-          <a:chOff x="0" y="0"/>
-          <a:chExt cx="0" cy="0"/>
-        </a:xfrm>
-      </p:grpSpPr>
-      <p:sp>
-        <p:nvSpPr>
-          <p:cNvPr id="2" name="Title 1">
-            <a:extLst>
-              <a:ext uri="{FF2B5EF4-FFF2-40B4-BE49-F238E27FC236}">
-                <a16:creationId xmlns:a16="http://schemas.microsoft.com/office/drawing/2014/main" id="{D7C9A23D-3C01-40EF-A770-31F80415FD45}"/>
-              </a:ext>
-            </a:extLst>
-          </p:cNvPr>
-          <p:cNvSpPr>
-            <a:spLocks noGrp="1"/>
-          </p:cNvSpPr>
-          <p:nvPr>
-            <p:ph type="title"/>
-          </p:nvPr>
-        </p:nvSpPr>
-        <p:spPr/>
-        <p:txBody>
-          <a:bodyPr/>
-          <a:lstStyle/>
-          <a:p>
-            <a:r>
-              <a:rPr lang="en-US" b="1" dirty="0"/>
-              <a:t>DEMO: Exploring our data in a Worksheet</a:t>
-            </a:r>
-          </a:p>
-        </p:txBody>
-      </p:sp>
-      <p:sp>
-        <p:nvSpPr>
-          <p:cNvPr id="5" name="Text Placeholder 4">
-            <a:extLst>
-              <a:ext uri="{FF2B5EF4-FFF2-40B4-BE49-F238E27FC236}">
-                <a16:creationId xmlns:a16="http://schemas.microsoft.com/office/drawing/2014/main" id="{CF1C9D25-EEF4-40F0-B8E1-A97B3AD7400F}"/>
-              </a:ext>
-            </a:extLst>
-          </p:cNvPr>
-          <p:cNvSpPr>
-            <a:spLocks noGrp="1"/>
-          </p:cNvSpPr>
-          <p:nvPr>
-            <p:ph type="body" idx="1"/>
-          </p:nvPr>
-        </p:nvSpPr>
-        <p:spPr/>
-        <p:txBody>
-          <a:bodyPr/>
-          <a:lstStyle/>
-          <a:p>
-            <a:endParaRPr lang="en-US" dirty="0"/>
-          </a:p>
-        </p:txBody>
-      </p:sp>
-    </p:spTree>
-    <p:extLst>
-      <p:ext uri="{BB962C8B-B14F-4D97-AF65-F5344CB8AC3E}">
-        <p14:creationId xmlns:p14="http://schemas.microsoft.com/office/powerpoint/2010/main" val="3015222969"/>
-      </p:ext>
-    </p:extLst>
-  </p:cSld>
-  <p:clrMapOvr>
-    <a:masterClrMapping/>
-  </p:clrMapOvr>
+  <p:timing>
+    <p:tnLst>
+      <p:par>
+        <p:cTn id="1" dur="indefinite" restart="never" nodeType="tmRoot"/>
+      </p:par>
+    </p:tnLst>
+  </p:timing>
 </p:sld>
 </file>
 
@@ -8985,6 +9268,104 @@
       </p:grpSpPr>
       <p:sp>
         <p:nvSpPr>
+          <p:cNvPr id="2" name="Title 1">
+            <a:extLst>
+              <a:ext uri="{FF2B5EF4-FFF2-40B4-BE49-F238E27FC236}">
+                <a16:creationId xmlns:a16="http://schemas.microsoft.com/office/drawing/2014/main" id="{D7C9A23D-3C01-40EF-A770-31F80415FD45}"/>
+              </a:ext>
+            </a:extLst>
+          </p:cNvPr>
+          <p:cNvSpPr>
+            <a:spLocks noGrp="1"/>
+          </p:cNvSpPr>
+          <p:nvPr>
+            <p:ph type="title"/>
+          </p:nvPr>
+        </p:nvSpPr>
+        <p:spPr/>
+        <p:txBody>
+          <a:bodyPr/>
+          <a:lstStyle/>
+          <a:p>
+            <a:r>
+              <a:rPr lang="en-US" b="1" dirty="0"/>
+              <a:t>DEMO: </a:t>
+            </a:r>
+            <a:r>
+              <a:rPr lang="en-US" b="1" dirty="0" smtClean="0"/>
+              <a:t>Exploring </a:t>
+            </a:r>
+            <a:r>
+              <a:rPr lang="en-US" b="1" dirty="0"/>
+              <a:t>our data in a Worksheet</a:t>
+            </a:r>
+          </a:p>
+        </p:txBody>
+      </p:sp>
+      <p:sp>
+        <p:nvSpPr>
+          <p:cNvPr id="5" name="Text Placeholder 4">
+            <a:extLst>
+              <a:ext uri="{FF2B5EF4-FFF2-40B4-BE49-F238E27FC236}">
+                <a16:creationId xmlns:a16="http://schemas.microsoft.com/office/drawing/2014/main" id="{CF1C9D25-EEF4-40F0-B8E1-A97B3AD7400F}"/>
+              </a:ext>
+            </a:extLst>
+          </p:cNvPr>
+          <p:cNvSpPr>
+            <a:spLocks noGrp="1"/>
+          </p:cNvSpPr>
+          <p:nvPr>
+            <p:ph type="body" idx="1"/>
+          </p:nvPr>
+        </p:nvSpPr>
+        <p:spPr/>
+        <p:txBody>
+          <a:bodyPr/>
+          <a:lstStyle/>
+          <a:p>
+            <a:endParaRPr lang="en-US" dirty="0"/>
+          </a:p>
+        </p:txBody>
+      </p:sp>
+    </p:spTree>
+    <p:extLst>
+      <p:ext uri="{BB962C8B-B14F-4D97-AF65-F5344CB8AC3E}">
+        <p14:creationId xmlns:p14="http://schemas.microsoft.com/office/powerpoint/2010/main" val="3015222969"/>
+      </p:ext>
+    </p:extLst>
+  </p:cSld>
+  <p:clrMapOvr>
+    <a:masterClrMapping/>
+  </p:clrMapOvr>
+  <p:timing>
+    <p:tnLst>
+      <p:par>
+        <p:cTn id="1" dur="indefinite" restart="never" nodeType="tmRoot"/>
+      </p:par>
+    </p:tnLst>
+  </p:timing>
+</p:sld>
+</file>
+
+<file path=ppt/slides/slide23.xml><?xml version="1.0" encoding="utf-8"?>
+<p:sld xmlns:a="http://schemas.openxmlformats.org/drawingml/2006/main" xmlns:r="http://schemas.openxmlformats.org/officeDocument/2006/relationships" xmlns:p="http://schemas.openxmlformats.org/presentationml/2006/main">
+  <p:cSld>
+    <p:spTree>
+      <p:nvGrpSpPr>
+        <p:cNvPr id="1" name=""/>
+        <p:cNvGrpSpPr/>
+        <p:nvPr/>
+      </p:nvGrpSpPr>
+      <p:grpSpPr>
+        <a:xfrm>
+          <a:off x="0" y="0"/>
+          <a:ext cx="0" cy="0"/>
+          <a:chOff x="0" y="0"/>
+          <a:chExt cx="0" cy="0"/>
+        </a:xfrm>
+      </p:grpSpPr>
+      <p:sp>
+        <p:nvSpPr>
           <p:cNvPr id="2" name="Title 1"/>
           <p:cNvSpPr>
             <a:spLocks noGrp="1"/>
@@ -9029,8 +9410,12 @@
           <a:lstStyle/>
           <a:p>
             <a:r>
+              <a:rPr lang="en-US" dirty="0" smtClean="0"/>
+              <a:t>15 </a:t>
+            </a:r>
+            <a:r>
               <a:rPr lang="en-US" dirty="0"/>
-              <a:t>15 minutes</a:t>
+              <a:t>minutes</a:t>
             </a:r>
           </a:p>
         </p:txBody>
@@ -9045,10 +9430,17 @@
   <p:clrMapOvr>
     <a:masterClrMapping/>
   </p:clrMapOvr>
+  <p:timing>
+    <p:tnLst>
+      <p:par>
+        <p:cTn id="1" dur="indefinite" restart="never" nodeType="tmRoot"/>
+      </p:par>
+    </p:tnLst>
+  </p:timing>
 </p:sld>
 </file>
 
-<file path=ppt/slides/slide23.xml><?xml version="1.0" encoding="utf-8"?>
+<file path=ppt/slides/slide24.xml><?xml version="1.0" encoding="utf-8"?>
 <p:sld xmlns:a="http://schemas.openxmlformats.org/drawingml/2006/main" xmlns:r="http://schemas.openxmlformats.org/officeDocument/2006/relationships" xmlns:p="http://schemas.openxmlformats.org/presentationml/2006/main">
   <p:cSld>
     <p:spTree>
@@ -9491,101 +9883,13 @@
   <p:clrMapOvr>
     <a:masterClrMapping/>
   </p:clrMapOvr>
-</p:sld>
-</file>
-
-<file path=ppt/slides/slide24.xml><?xml version="1.0" encoding="utf-8"?>
-<p:sld xmlns:a="http://schemas.openxmlformats.org/drawingml/2006/main" xmlns:r="http://schemas.openxmlformats.org/officeDocument/2006/relationships" xmlns:p="http://schemas.openxmlformats.org/presentationml/2006/main">
-  <p:cSld>
-    <p:spTree>
-      <p:nvGrpSpPr>
-        <p:cNvPr id="1" name=""/>
-        <p:cNvGrpSpPr/>
-        <p:nvPr/>
-      </p:nvGrpSpPr>
-      <p:grpSpPr>
-        <a:xfrm>
-          <a:off x="0" y="0"/>
-          <a:ext cx="0" cy="0"/>
-          <a:chOff x="0" y="0"/>
-          <a:chExt cx="0" cy="0"/>
-        </a:xfrm>
-      </p:grpSpPr>
-      <p:sp>
-        <p:nvSpPr>
-          <p:cNvPr id="2" name="Title 1">
-            <a:extLst>
-              <a:ext uri="{FF2B5EF4-FFF2-40B4-BE49-F238E27FC236}">
-                <a16:creationId xmlns:a16="http://schemas.microsoft.com/office/drawing/2014/main" id="{D74CEF50-C15B-4EB8-A5B5-A3F592BBDD7C}"/>
-              </a:ext>
-            </a:extLst>
-          </p:cNvPr>
-          <p:cNvSpPr>
-            <a:spLocks noGrp="1"/>
-          </p:cNvSpPr>
-          <p:nvPr>
-            <p:ph type="title"/>
-          </p:nvPr>
-        </p:nvSpPr>
-        <p:spPr/>
-        <p:txBody>
-          <a:bodyPr/>
-          <a:lstStyle/>
-          <a:p>
-            <a:r>
-              <a:rPr lang="en-US" b="1" dirty="0"/>
-              <a:t>DEMO: Building a Dashboard</a:t>
-            </a:r>
-          </a:p>
-        </p:txBody>
-      </p:sp>
-      <p:sp>
-        <p:nvSpPr>
-          <p:cNvPr id="3" name="Content Placeholder 2">
-            <a:extLst>
-              <a:ext uri="{FF2B5EF4-FFF2-40B4-BE49-F238E27FC236}">
-                <a16:creationId xmlns:a16="http://schemas.microsoft.com/office/drawing/2014/main" id="{1188807D-D4CB-4E5D-90E7-6C73215FB8BB}"/>
-              </a:ext>
-            </a:extLst>
-          </p:cNvPr>
-          <p:cNvSpPr>
-            <a:spLocks noGrp="1"/>
-          </p:cNvSpPr>
-          <p:nvPr>
-            <p:ph idx="1"/>
-          </p:nvPr>
-        </p:nvSpPr>
-        <p:spPr/>
-        <p:txBody>
-          <a:bodyPr/>
-          <a:lstStyle/>
-          <a:p>
-            <a:r>
-              <a:rPr lang="en-US" dirty="0"/>
-              <a:t>Advanced Dashboards:</a:t>
-            </a:r>
-          </a:p>
-          <a:p>
-            <a:r>
-              <a:rPr lang="en-US" dirty="0">
-                <a:hlinkClick r:id="rId3"/>
-              </a:rPr>
-              <a:t>https://public.tableau.com/profile/connor.jp.smith#!/vizhome/AHRQT01MethodsPilot-PacificNorthwestEPCV2_1/NonpharmacologicalInterventionsforPain</a:t>
-            </a:r>
-            <a:endParaRPr lang="en-US" dirty="0"/>
-          </a:p>
-        </p:txBody>
-      </p:sp>
-    </p:spTree>
-    <p:extLst>
-      <p:ext uri="{BB962C8B-B14F-4D97-AF65-F5344CB8AC3E}">
-        <p14:creationId xmlns:p14="http://schemas.microsoft.com/office/powerpoint/2010/main" val="2802124873"/>
-      </p:ext>
-    </p:extLst>
-  </p:cSld>
-  <p:clrMapOvr>
-    <a:masterClrMapping/>
-  </p:clrMapOvr>
+  <p:timing>
+    <p:tnLst>
+      <p:par>
+        <p:cTn id="1" dur="indefinite" restart="never" nodeType="tmRoot"/>
+      </p:par>
+    </p:tnLst>
+  </p:timing>
 </p:sld>
 </file>
 
@@ -9611,7 +9915,7 @@
           <p:cNvPr id="2" name="Title 1">
             <a:extLst>
               <a:ext uri="{FF2B5EF4-FFF2-40B4-BE49-F238E27FC236}">
-                <a16:creationId xmlns:a16="http://schemas.microsoft.com/office/drawing/2014/main" id="{9352703D-7C48-47D8-A0B8-B4D00875C45A}"/>
+                <a16:creationId xmlns:a16="http://schemas.microsoft.com/office/drawing/2014/main" id="{D74CEF50-C15B-4EB8-A5B5-A3F592BBDD7C}"/>
               </a:ext>
             </a:extLst>
           </p:cNvPr>
@@ -9629,7 +9933,7 @@
           <a:p>
             <a:r>
               <a:rPr lang="en-US" b="1" dirty="0"/>
-              <a:t>EXERCISE: Build a Dashboard (20 minutes)</a:t>
+              <a:t>DEMO: Building a Dashboard</a:t>
             </a:r>
           </a:p>
         </p:txBody>
@@ -9639,7 +9943,7 @@
           <p:cNvPr id="3" name="Content Placeholder 2">
             <a:extLst>
               <a:ext uri="{FF2B5EF4-FFF2-40B4-BE49-F238E27FC236}">
-                <a16:creationId xmlns:a16="http://schemas.microsoft.com/office/drawing/2014/main" id="{888FB101-4EF7-432F-9BB0-3B9F75941B73}"/>
+                <a16:creationId xmlns:a16="http://schemas.microsoft.com/office/drawing/2014/main" id="{1188807D-D4CB-4E5D-90E7-6C73215FB8BB}"/>
               </a:ext>
             </a:extLst>
           </p:cNvPr>
@@ -9657,52 +9961,39 @@
           </a:bodyPr>
           <a:lstStyle/>
           <a:p>
-            <a:pPr marL="457200" indent="-457200">
-              <a:buFont typeface="+mj-lt"/>
-              <a:buAutoNum type="arabicPeriod"/>
-            </a:pPr>
             <a:r>
               <a:rPr lang="en-US" sz="2800" dirty="0"/>
-              <a:t>Create an additional Worksheet that can relate to your original</a:t>
-            </a:r>
-          </a:p>
-          <a:p>
-            <a:pPr marL="749808" lvl="1" indent="-457200"/>
-            <a:r>
-              <a:rPr lang="en-US" sz="2400" dirty="0"/>
-              <a:t>New Worksheet can filter the old </a:t>
-            </a:r>
-            <a:r>
-              <a:rPr lang="en-US" sz="2400" b="1" dirty="0"/>
-              <a:t>OR</a:t>
-            </a:r>
-            <a:r>
-              <a:rPr lang="en-US" sz="2400" dirty="0"/>
-              <a:t> vice-versa</a:t>
-            </a:r>
-          </a:p>
-          <a:p>
-            <a:pPr marL="457200" indent="-457200">
-              <a:buFont typeface="+mj-lt"/>
-              <a:buAutoNum type="arabicPeriod"/>
-            </a:pPr>
-            <a:r>
-              <a:rPr lang="en-US" sz="2800" dirty="0"/>
-              <a:t>Create a Dashboard with your two worksheets</a:t>
-            </a:r>
+              <a:t>Advanced Dashboards:</a:t>
+            </a:r>
+          </a:p>
+          <a:p>
+            <a:r>
+              <a:rPr lang="en-US" sz="2800" dirty="0">
+                <a:hlinkClick r:id="rId3"/>
+              </a:rPr>
+              <a:t>https://public.tableau.com/profile/connor.jp.smith#!/vizhome/AHRQT01MethodsPilot-PacificNorthwestEPCV2_1/NonpharmacologicalInterventionsforPain</a:t>
+            </a:r>
+            <a:endParaRPr lang="en-US" sz="2800" dirty="0"/>
           </a:p>
         </p:txBody>
       </p:sp>
     </p:spTree>
     <p:extLst>
       <p:ext uri="{BB962C8B-B14F-4D97-AF65-F5344CB8AC3E}">
-        <p14:creationId xmlns:p14="http://schemas.microsoft.com/office/powerpoint/2010/main" val="1317997002"/>
+        <p14:creationId xmlns:p14="http://schemas.microsoft.com/office/powerpoint/2010/main" val="2802124873"/>
       </p:ext>
     </p:extLst>
   </p:cSld>
   <p:clrMapOvr>
     <a:masterClrMapping/>
   </p:clrMapOvr>
+  <p:timing>
+    <p:tnLst>
+      <p:par>
+        <p:cTn id="1" dur="indefinite" restart="never" nodeType="tmRoot"/>
+      </p:par>
+    </p:tnLst>
+  </p:timing>
 </p:sld>
 </file>
 
@@ -9728,6 +10019,130 @@
           <p:cNvPr id="2" name="Title 1">
             <a:extLst>
               <a:ext uri="{FF2B5EF4-FFF2-40B4-BE49-F238E27FC236}">
+                <a16:creationId xmlns:a16="http://schemas.microsoft.com/office/drawing/2014/main" id="{9352703D-7C48-47D8-A0B8-B4D00875C45A}"/>
+              </a:ext>
+            </a:extLst>
+          </p:cNvPr>
+          <p:cNvSpPr>
+            <a:spLocks noGrp="1"/>
+          </p:cNvSpPr>
+          <p:nvPr>
+            <p:ph type="title"/>
+          </p:nvPr>
+        </p:nvSpPr>
+        <p:spPr/>
+        <p:txBody>
+          <a:bodyPr/>
+          <a:lstStyle/>
+          <a:p>
+            <a:r>
+              <a:rPr lang="en-US" b="1" dirty="0"/>
+              <a:t>EXERCISE: Build a Dashboard (20 minutes)</a:t>
+            </a:r>
+          </a:p>
+        </p:txBody>
+      </p:sp>
+      <p:sp>
+        <p:nvSpPr>
+          <p:cNvPr id="3" name="Content Placeholder 2">
+            <a:extLst>
+              <a:ext uri="{FF2B5EF4-FFF2-40B4-BE49-F238E27FC236}">
+                <a16:creationId xmlns:a16="http://schemas.microsoft.com/office/drawing/2014/main" id="{888FB101-4EF7-432F-9BB0-3B9F75941B73}"/>
+              </a:ext>
+            </a:extLst>
+          </p:cNvPr>
+          <p:cNvSpPr>
+            <a:spLocks noGrp="1"/>
+          </p:cNvSpPr>
+          <p:nvPr>
+            <p:ph idx="1"/>
+          </p:nvPr>
+        </p:nvSpPr>
+        <p:spPr/>
+        <p:txBody>
+          <a:bodyPr>
+            <a:normAutofit/>
+          </a:bodyPr>
+          <a:lstStyle/>
+          <a:p>
+            <a:pPr marL="457200" indent="-457200">
+              <a:buFont typeface="+mj-lt"/>
+              <a:buAutoNum type="arabicPeriod"/>
+            </a:pPr>
+            <a:r>
+              <a:rPr lang="en-US" sz="2800" dirty="0"/>
+              <a:t>Create an additional Worksheet that can relate to your original</a:t>
+            </a:r>
+          </a:p>
+          <a:p>
+            <a:pPr marL="749808" lvl="1" indent="-457200"/>
+            <a:r>
+              <a:rPr lang="en-US" sz="2400" dirty="0"/>
+              <a:t>New Worksheet can filter the old </a:t>
+            </a:r>
+            <a:r>
+              <a:rPr lang="en-US" sz="2400" b="1" dirty="0"/>
+              <a:t>OR</a:t>
+            </a:r>
+            <a:r>
+              <a:rPr lang="en-US" sz="2400" dirty="0"/>
+              <a:t> vice-versa</a:t>
+            </a:r>
+          </a:p>
+          <a:p>
+            <a:pPr marL="457200" indent="-457200">
+              <a:buFont typeface="+mj-lt"/>
+              <a:buAutoNum type="arabicPeriod"/>
+            </a:pPr>
+            <a:r>
+              <a:rPr lang="en-US" sz="2800" dirty="0"/>
+              <a:t>Create a Dashboard with your two worksheets</a:t>
+            </a:r>
+          </a:p>
+        </p:txBody>
+      </p:sp>
+    </p:spTree>
+    <p:extLst>
+      <p:ext uri="{BB962C8B-B14F-4D97-AF65-F5344CB8AC3E}">
+        <p14:creationId xmlns:p14="http://schemas.microsoft.com/office/powerpoint/2010/main" val="1317997002"/>
+      </p:ext>
+    </p:extLst>
+  </p:cSld>
+  <p:clrMapOvr>
+    <a:masterClrMapping/>
+  </p:clrMapOvr>
+  <p:timing>
+    <p:tnLst>
+      <p:par>
+        <p:cTn id="1" dur="indefinite" restart="never" nodeType="tmRoot"/>
+      </p:par>
+    </p:tnLst>
+  </p:timing>
+</p:sld>
+</file>
+
+<file path=ppt/slides/slide27.xml><?xml version="1.0" encoding="utf-8"?>
+<p:sld xmlns:a="http://schemas.openxmlformats.org/drawingml/2006/main" xmlns:r="http://schemas.openxmlformats.org/officeDocument/2006/relationships" xmlns:p="http://schemas.openxmlformats.org/presentationml/2006/main">
+  <p:cSld>
+    <p:spTree>
+      <p:nvGrpSpPr>
+        <p:cNvPr id="1" name=""/>
+        <p:cNvGrpSpPr/>
+        <p:nvPr/>
+      </p:nvGrpSpPr>
+      <p:grpSpPr>
+        <a:xfrm>
+          <a:off x="0" y="0"/>
+          <a:ext cx="0" cy="0"/>
+          <a:chOff x="0" y="0"/>
+          <a:chExt cx="0" cy="0"/>
+        </a:xfrm>
+      </p:grpSpPr>
+      <p:sp>
+        <p:nvSpPr>
+          <p:cNvPr id="2" name="Title 1">
+            <a:extLst>
+              <a:ext uri="{FF2B5EF4-FFF2-40B4-BE49-F238E27FC236}">
                 <a16:creationId xmlns:a16="http://schemas.microsoft.com/office/drawing/2014/main" id="{59CDF3ED-73C3-442E-A1B0-7FE692B37232}"/>
               </a:ext>
             </a:extLst>
@@ -9774,34 +10189,36 @@
           </a:xfrm>
         </p:spPr>
         <p:txBody>
-          <a:bodyPr/>
-          <a:lstStyle/>
-          <a:p>
-            <a:r>
-              <a:rPr lang="en-US" dirty="0"/>
+          <a:bodyPr>
+            <a:normAutofit/>
+          </a:bodyPr>
+          <a:lstStyle/>
+          <a:p>
+            <a:r>
+              <a:rPr lang="en-US" sz="2400" dirty="0"/>
               <a:t>Allows you to save the “state” of a Dashboard or Worksheet to tell a “story”</a:t>
             </a:r>
           </a:p>
           <a:p>
             <a:r>
-              <a:rPr lang="en-US" dirty="0"/>
+              <a:rPr lang="en-US" sz="2400" dirty="0"/>
               <a:t>Can include a narrative about the data – great for posterity</a:t>
             </a:r>
           </a:p>
           <a:p>
             <a:r>
-              <a:rPr lang="en-US" dirty="0">
+              <a:rPr lang="en-US" sz="2400" dirty="0">
                 <a:hlinkClick r:id="rId3"/>
               </a:rPr>
               <a:t>https://public.tableau.com/views/AHRQT01MethodsPilot-PacificNorthwestEPCV2_1/GuidedComparison?:embed=y&amp;:display_count=yes&amp;:origin=viz_share_link</a:t>
             </a:r>
-            <a:endParaRPr lang="en-US" dirty="0"/>
-          </a:p>
-          <a:p>
-            <a:endParaRPr lang="en-US" dirty="0"/>
-          </a:p>
-          <a:p>
-            <a:endParaRPr lang="en-US" dirty="0"/>
+            <a:endParaRPr lang="en-US" sz="2400" dirty="0"/>
+          </a:p>
+          <a:p>
+            <a:endParaRPr lang="en-US" sz="2400" dirty="0"/>
+          </a:p>
+          <a:p>
+            <a:endParaRPr lang="en-US" sz="2400" dirty="0"/>
           </a:p>
         </p:txBody>
       </p:sp>
@@ -10144,119 +10561,13 @@
   <p:clrMapOvr>
     <a:masterClrMapping/>
   </p:clrMapOvr>
-</p:sld>
-</file>
-
-<file path=ppt/slides/slide27.xml><?xml version="1.0" encoding="utf-8"?>
-<p:sld xmlns:a="http://schemas.openxmlformats.org/drawingml/2006/main" xmlns:r="http://schemas.openxmlformats.org/officeDocument/2006/relationships" xmlns:p="http://schemas.openxmlformats.org/presentationml/2006/main">
-  <p:cSld>
-    <p:spTree>
-      <p:nvGrpSpPr>
-        <p:cNvPr id="1" name=""/>
-        <p:cNvGrpSpPr/>
-        <p:nvPr/>
-      </p:nvGrpSpPr>
-      <p:grpSpPr>
-        <a:xfrm>
-          <a:off x="0" y="0"/>
-          <a:ext cx="0" cy="0"/>
-          <a:chOff x="0" y="0"/>
-          <a:chExt cx="0" cy="0"/>
-        </a:xfrm>
-      </p:grpSpPr>
-      <p:sp>
-        <p:nvSpPr>
-          <p:cNvPr id="2" name="Title 1">
-            <a:extLst>
-              <a:ext uri="{FF2B5EF4-FFF2-40B4-BE49-F238E27FC236}">
-                <a16:creationId xmlns:a16="http://schemas.microsoft.com/office/drawing/2014/main" id="{3011108E-DBC4-49B9-A219-0B15282A483C}"/>
-              </a:ext>
-            </a:extLst>
-          </p:cNvPr>
-          <p:cNvSpPr>
-            <a:spLocks noGrp="1"/>
-          </p:cNvSpPr>
-          <p:nvPr>
-            <p:ph type="title"/>
-          </p:nvPr>
-        </p:nvSpPr>
-        <p:spPr/>
-        <p:txBody>
-          <a:bodyPr>
-            <a:normAutofit/>
-          </a:bodyPr>
-          <a:lstStyle/>
-          <a:p>
-            <a:r>
-              <a:rPr lang="en-US" b="1" dirty="0"/>
-              <a:t>EXERCISE:</a:t>
-            </a:r>
-            <a:r>
-              <a:rPr lang="en-US" dirty="0"/>
-              <a:t> </a:t>
-            </a:r>
-            <a:r>
-              <a:rPr lang="en-US" b="1" dirty="0"/>
-              <a:t>Tell a story (10 minutes)</a:t>
-            </a:r>
-          </a:p>
-        </p:txBody>
-      </p:sp>
-      <p:sp>
-        <p:nvSpPr>
-          <p:cNvPr id="3" name="Content Placeholder 2">
-            <a:extLst>
-              <a:ext uri="{FF2B5EF4-FFF2-40B4-BE49-F238E27FC236}">
-                <a16:creationId xmlns:a16="http://schemas.microsoft.com/office/drawing/2014/main" id="{54180EBC-5075-47C4-8664-F1E8C6B1F7FF}"/>
-              </a:ext>
-            </a:extLst>
-          </p:cNvPr>
-          <p:cNvSpPr>
-            <a:spLocks noGrp="1"/>
-          </p:cNvSpPr>
-          <p:nvPr>
-            <p:ph idx="1"/>
-          </p:nvPr>
-        </p:nvSpPr>
-        <p:spPr/>
-        <p:txBody>
-          <a:bodyPr>
-            <a:normAutofit/>
-          </a:bodyPr>
-          <a:lstStyle/>
-          <a:p>
-            <a:r>
-              <a:rPr lang="en-US" sz="2800" dirty="0"/>
-              <a:t>Create a Story using your Dashboard</a:t>
-            </a:r>
-          </a:p>
-          <a:p>
-            <a:pPr lvl="1"/>
-            <a:r>
-              <a:rPr lang="en-US" sz="2400" dirty="0"/>
-              <a:t>Include 2-3 “slides” and a narrative aspect</a:t>
-            </a:r>
-          </a:p>
-          <a:p>
-            <a:pPr lvl="1"/>
-            <a:r>
-              <a:rPr lang="en-US" sz="2400" b="1" dirty="0"/>
-              <a:t>OPTIONAL: Add annotations</a:t>
-            </a:r>
-            <a:endParaRPr lang="en-US" sz="2400" dirty="0"/>
-          </a:p>
-        </p:txBody>
-      </p:sp>
-    </p:spTree>
-    <p:extLst>
-      <p:ext uri="{BB962C8B-B14F-4D97-AF65-F5344CB8AC3E}">
-        <p14:creationId xmlns:p14="http://schemas.microsoft.com/office/powerpoint/2010/main" val="780308163"/>
-      </p:ext>
-    </p:extLst>
-  </p:cSld>
-  <p:clrMapOvr>
-    <a:masterClrMapping/>
-  </p:clrMapOvr>
+  <p:timing>
+    <p:tnLst>
+      <p:par>
+        <p:cTn id="1" dur="indefinite" restart="never" nodeType="tmRoot"/>
+      </p:par>
+    </p:tnLst>
+  </p:timing>
 </p:sld>
 </file>
 
@@ -10282,7 +10593,7 @@
           <p:cNvPr id="2" name="Title 1">
             <a:extLst>
               <a:ext uri="{FF2B5EF4-FFF2-40B4-BE49-F238E27FC236}">
-                <a16:creationId xmlns:a16="http://schemas.microsoft.com/office/drawing/2014/main" id="{16DAECFD-B804-410D-99A1-892328D68F3E}"/>
+                <a16:creationId xmlns:a16="http://schemas.microsoft.com/office/drawing/2014/main" id="{3011108E-DBC4-49B9-A219-0B15282A483C}"/>
               </a:ext>
             </a:extLst>
           </p:cNvPr>
@@ -10295,12 +10606,22 @@
         </p:nvSpPr>
         <p:spPr/>
         <p:txBody>
-          <a:bodyPr/>
-          <a:lstStyle/>
-          <a:p>
+          <a:bodyPr>
+            <a:normAutofit/>
+          </a:bodyPr>
+          <a:lstStyle/>
+          <a:p>
+            <a:r>
+              <a:rPr lang="en-US" b="1" dirty="0"/>
+              <a:t>EXERCISE:</a:t>
+            </a:r>
             <a:r>
               <a:rPr lang="en-US" dirty="0"/>
-              <a:t>Tableau Creator/Academic</a:t>
+              <a:t> </a:t>
+            </a:r>
+            <a:r>
+              <a:rPr lang="en-US" b="1" dirty="0"/>
+              <a:t>Tell a story (10 minutes)</a:t>
             </a:r>
           </a:p>
         </p:txBody>
@@ -10310,7 +10631,7 @@
           <p:cNvPr id="3" name="Content Placeholder 2">
             <a:extLst>
               <a:ext uri="{FF2B5EF4-FFF2-40B4-BE49-F238E27FC236}">
-                <a16:creationId xmlns:a16="http://schemas.microsoft.com/office/drawing/2014/main" id="{A559954C-7433-4A90-A8B8-513058C6D3E2}"/>
+                <a16:creationId xmlns:a16="http://schemas.microsoft.com/office/drawing/2014/main" id="{54180EBC-5075-47C4-8664-F1E8C6B1F7FF}"/>
               </a:ext>
             </a:extLst>
           </p:cNvPr>
@@ -10329,123 +10650,44 @@
           <a:lstStyle/>
           <a:p>
             <a:r>
-              <a:rPr lang="en-US" dirty="0"/>
-              <a:t>Tableau Desktop</a:t>
+              <a:rPr lang="en-US" sz="3200" dirty="0"/>
+              <a:t>Create a Story using your Dashboard</a:t>
             </a:r>
           </a:p>
           <a:p>
             <a:pPr lvl="1"/>
             <a:r>
-              <a:rPr lang="en-US" dirty="0"/>
-              <a:t>Included with Creator package</a:t>
+              <a:rPr lang="en-US" sz="2800" dirty="0"/>
+              <a:t>Include 2-3 “slides” and a narrative aspect</a:t>
             </a:r>
           </a:p>
           <a:p>
             <a:pPr lvl="1"/>
             <a:r>
-              <a:rPr lang="en-US" dirty="0"/>
-              <a:t>1 year license</a:t>
-            </a:r>
-          </a:p>
-          <a:p>
-            <a:pPr lvl="1"/>
-            <a:r>
-              <a:rPr lang="en-US" b="1" dirty="0"/>
-              <a:t>Students and Instructors:</a:t>
-            </a:r>
-            <a:r>
-              <a:rPr lang="en-US" dirty="0"/>
-              <a:t> Can request an educational license</a:t>
-            </a:r>
-          </a:p>
-          <a:p>
-            <a:pPr lvl="2"/>
-            <a:r>
-              <a:rPr lang="en-US" dirty="0"/>
-              <a:t>Can be renewed yearly, if still in school/teaching</a:t>
-            </a:r>
-          </a:p>
-          <a:p>
-            <a:pPr lvl="2"/>
-            <a:r>
-              <a:rPr lang="en-US" b="1" dirty="0"/>
-              <a:t>Students: </a:t>
-            </a:r>
-            <a:r>
-              <a:rPr lang="en-US" dirty="0">
-                <a:hlinkClick r:id="rId2"/>
-              </a:rPr>
-              <a:t>https://www.tableau.com/academic/students</a:t>
-            </a:r>
-            <a:endParaRPr lang="en-US" b="1" dirty="0"/>
-          </a:p>
-          <a:p>
-            <a:pPr lvl="2"/>
-            <a:r>
-              <a:rPr lang="en-US" b="1" dirty="0"/>
-              <a:t>Instructors Course/Lab License: </a:t>
-            </a:r>
-            <a:r>
-              <a:rPr lang="en-US" dirty="0">
-                <a:hlinkClick r:id="rId3"/>
-              </a:rPr>
-              <a:t>https://www.tableau.com/academic/teaching/course-licenses</a:t>
-            </a:r>
-            <a:endParaRPr lang="en-US" dirty="0"/>
-          </a:p>
-          <a:p>
-            <a:pPr lvl="2"/>
-            <a:r>
-              <a:rPr lang="en-US" b="1" dirty="0"/>
-              <a:t>Instructors Individual License: </a:t>
-            </a:r>
-            <a:r>
-              <a:rPr lang="en-US" dirty="0">
-                <a:hlinkClick r:id="rId4"/>
-              </a:rPr>
-              <a:t>https://www.tableau.com/academic/teaching</a:t>
-            </a:r>
-            <a:endParaRPr lang="en-US" b="1" dirty="0"/>
-          </a:p>
-          <a:p>
-            <a:r>
-              <a:rPr lang="en-US" dirty="0"/>
-              <a:t>Tableau Server</a:t>
-            </a:r>
-          </a:p>
-          <a:p>
-            <a:pPr lvl="1"/>
-            <a:r>
-              <a:rPr lang="en-US" dirty="0"/>
-              <a:t>Included with Creator package</a:t>
-            </a:r>
-          </a:p>
-          <a:p>
-            <a:pPr lvl="1"/>
-            <a:r>
-              <a:rPr lang="en-US" dirty="0"/>
-              <a:t>Allows for a hosted server for Tableau visualizations</a:t>
-            </a:r>
-          </a:p>
-          <a:p>
-            <a:pPr lvl="1"/>
-            <a:r>
-              <a:rPr lang="en-US" b="1" dirty="0"/>
-              <a:t>Can put PHI, if it is secured</a:t>
-            </a:r>
+              <a:rPr lang="en-US" sz="2800" b="1" dirty="0"/>
+              <a:t>OPTIONAL: Add annotations</a:t>
+            </a:r>
+            <a:endParaRPr lang="en-US" sz="2800" dirty="0"/>
           </a:p>
         </p:txBody>
       </p:sp>
     </p:spTree>
     <p:extLst>
       <p:ext uri="{BB962C8B-B14F-4D97-AF65-F5344CB8AC3E}">
-        <p14:creationId xmlns:p14="http://schemas.microsoft.com/office/powerpoint/2010/main" val="364781747"/>
+        <p14:creationId xmlns:p14="http://schemas.microsoft.com/office/powerpoint/2010/main" val="780308163"/>
       </p:ext>
     </p:extLst>
   </p:cSld>
   <p:clrMapOvr>
     <a:masterClrMapping/>
   </p:clrMapOvr>
+  <p:timing>
+    <p:tnLst>
+      <p:par>
+        <p:cTn id="1" dur="indefinite" restart="never" nodeType="tmRoot"/>
+      </p:par>
+    </p:tnLst>
+  </p:timing>
 </p:sld>
 </file>
 
@@ -10471,7 +10713,7 @@
           <p:cNvPr id="2" name="Title 1">
             <a:extLst>
               <a:ext uri="{FF2B5EF4-FFF2-40B4-BE49-F238E27FC236}">
-                <a16:creationId xmlns:a16="http://schemas.microsoft.com/office/drawing/2014/main" id="{352CF587-1B3A-4E92-8FAC-F1FB018BC99E}"/>
+                <a16:creationId xmlns:a16="http://schemas.microsoft.com/office/drawing/2014/main" id="{16DAECFD-B804-410D-99A1-892328D68F3E}"/>
               </a:ext>
             </a:extLst>
           </p:cNvPr>
@@ -10489,7 +10731,7 @@
           <a:p>
             <a:r>
               <a:rPr lang="en-US" dirty="0"/>
-              <a:t>Online Tableau Options</a:t>
+              <a:t>Tableau Creator/Academic</a:t>
             </a:r>
           </a:p>
         </p:txBody>
@@ -10499,7 +10741,7 @@
           <p:cNvPr id="3" name="Content Placeholder 2">
             <a:extLst>
               <a:ext uri="{FF2B5EF4-FFF2-40B4-BE49-F238E27FC236}">
-                <a16:creationId xmlns:a16="http://schemas.microsoft.com/office/drawing/2014/main" id="{FD801550-CFFA-41C0-8B99-BB57DB502D2F}"/>
+                <a16:creationId xmlns:a16="http://schemas.microsoft.com/office/drawing/2014/main" id="{A559954C-7433-4A90-A8B8-513058C6D3E2}"/>
               </a:ext>
             </a:extLst>
           </p:cNvPr>
@@ -10512,101 +10754,152 @@
         </p:nvSpPr>
         <p:spPr/>
         <p:txBody>
-          <a:bodyPr/>
+          <a:bodyPr>
+            <a:normAutofit/>
+          </a:bodyPr>
           <a:lstStyle/>
           <a:p>
             <a:r>
               <a:rPr lang="en-US" dirty="0"/>
-              <a:t>Tableau Online</a:t>
+              <a:t>Tableau Desktop</a:t>
             </a:r>
           </a:p>
           <a:p>
             <a:pPr lvl="1"/>
             <a:r>
               <a:rPr lang="en-US" dirty="0"/>
-              <a:t>Online hosting of visualization via a paid service</a:t>
-            </a:r>
-          </a:p>
-          <a:p>
+              <a:t>Included with Creator package</a:t>
+            </a:r>
+          </a:p>
+          <a:p>
+            <a:pPr lvl="1"/>
             <a:r>
               <a:rPr lang="en-US" dirty="0"/>
-              <a:t>Tableau Public</a:t>
+              <a:t>1 year license</a:t>
             </a:r>
           </a:p>
           <a:p>
             <a:pPr lvl="1"/>
             <a:r>
+              <a:rPr lang="en-US" b="1" dirty="0"/>
+              <a:t>Students and Instructors:</a:t>
+            </a:r>
+            <a:r>
               <a:rPr lang="en-US" dirty="0"/>
-              <a:t>Desktop client</a:t>
+              <a:t> Can request </a:t>
+            </a:r>
+            <a:r>
+              <a:rPr lang="en-US" dirty="0" smtClean="0"/>
+              <a:t>a </a:t>
+            </a:r>
+            <a:r>
+              <a:rPr lang="en-US" b="1" dirty="0" smtClean="0"/>
+              <a:t>free</a:t>
+            </a:r>
+            <a:r>
+              <a:rPr lang="en-US" dirty="0" smtClean="0"/>
+              <a:t> </a:t>
+            </a:r>
+            <a:r>
+              <a:rPr lang="en-US" dirty="0"/>
+              <a:t>educational license</a:t>
             </a:r>
           </a:p>
           <a:p>
             <a:pPr lvl="2"/>
             <a:r>
               <a:rPr lang="en-US" dirty="0"/>
-              <a:t>Desktop client has slightly restricted options</a:t>
+              <a:t>Can be renewed yearly, if still in school/teaching</a:t>
+            </a:r>
+          </a:p>
+          <a:p>
+            <a:pPr lvl="2"/>
+            <a:r>
+              <a:rPr lang="en-US" b="1" dirty="0"/>
+              <a:t>Students: </a:t>
+            </a:r>
+            <a:r>
+              <a:rPr lang="en-US" dirty="0">
+                <a:hlinkClick r:id="rId2"/>
+              </a:rPr>
+              <a:t>https://www.tableau.com/academic/students</a:t>
+            </a:r>
+            <a:endParaRPr lang="en-US" b="1" dirty="0"/>
+          </a:p>
+          <a:p>
+            <a:pPr lvl="2"/>
+            <a:r>
+              <a:rPr lang="en-US" b="1" dirty="0"/>
+              <a:t>Instructors Course/Lab License: </a:t>
+            </a:r>
+            <a:r>
+              <a:rPr lang="en-US" dirty="0">
+                <a:hlinkClick r:id="rId3"/>
+              </a:rPr>
+              <a:t>https://www.tableau.com/academic/teaching/course-licenses</a:t>
+            </a:r>
+            <a:endParaRPr lang="en-US" dirty="0"/>
+          </a:p>
+          <a:p>
+            <a:pPr lvl="2"/>
+            <a:r>
+              <a:rPr lang="en-US" b="1" dirty="0"/>
+              <a:t>Instructors Individual License: </a:t>
+            </a:r>
+            <a:r>
+              <a:rPr lang="en-US" dirty="0">
+                <a:hlinkClick r:id="rId4"/>
+              </a:rPr>
+              <a:t>https://www.tableau.com/academic/teaching</a:t>
+            </a:r>
+            <a:endParaRPr lang="en-US" b="1" dirty="0"/>
+          </a:p>
+          <a:p>
+            <a:r>
+              <a:rPr lang="en-US" dirty="0"/>
+              <a:t>Tableau Server</a:t>
             </a:r>
           </a:p>
           <a:p>
             <a:pPr lvl="1"/>
             <a:r>
               <a:rPr lang="en-US" dirty="0"/>
-              <a:t>Unlimited Online Publishing</a:t>
-            </a:r>
-          </a:p>
-          <a:p>
-            <a:pPr lvl="2"/>
+              <a:t>Included with Creator package</a:t>
+            </a:r>
+          </a:p>
+          <a:p>
+            <a:pPr lvl="1"/>
             <a:r>
               <a:rPr lang="en-US" dirty="0"/>
-              <a:t>Must create and account</a:t>
-            </a:r>
-          </a:p>
-          <a:p>
-            <a:pPr lvl="2"/>
-            <a:r>
-              <a:rPr lang="en-US" dirty="0"/>
-              <a:t>Data must be an extract OR connected to an online, refreshable source</a:t>
-            </a:r>
-          </a:p>
-          <a:p>
-            <a:pPr lvl="2"/>
+              <a:t>Allows for a hosted server for Tableau visualizations</a:t>
+            </a:r>
+          </a:p>
+          <a:p>
+            <a:pPr lvl="1"/>
             <a:r>
               <a:rPr lang="en-US" b="1" dirty="0"/>
-              <a:t>NO PHI</a:t>
-            </a:r>
-            <a:endParaRPr lang="en-US" dirty="0"/>
-          </a:p>
-          <a:p>
-            <a:pPr lvl="2"/>
-            <a:r>
-              <a:rPr lang="en-US" b="1" dirty="0"/>
-              <a:t>You may allow others to download your workbook/data</a:t>
-            </a:r>
-            <a:endParaRPr lang="en-US" dirty="0"/>
-          </a:p>
-          <a:p>
-            <a:pPr lvl="2"/>
-            <a:r>
-              <a:rPr lang="en-US" dirty="0"/>
-              <a:t>Accessible via webpage/embedded</a:t>
-            </a:r>
-          </a:p>
-          <a:p>
-            <a:pPr lvl="1"/>
-            <a:endParaRPr lang="en-US" dirty="0"/>
+              <a:t>Can put PHI, if it is secured</a:t>
+            </a:r>
           </a:p>
         </p:txBody>
       </p:sp>
     </p:spTree>
     <p:extLst>
       <p:ext uri="{BB962C8B-B14F-4D97-AF65-F5344CB8AC3E}">
-        <p14:creationId xmlns:p14="http://schemas.microsoft.com/office/powerpoint/2010/main" val="3453521001"/>
+        <p14:creationId xmlns:p14="http://schemas.microsoft.com/office/powerpoint/2010/main" val="364781747"/>
       </p:ext>
     </p:extLst>
   </p:cSld>
   <p:clrMapOvr>
     <a:masterClrMapping/>
   </p:clrMapOvr>
+  <p:timing>
+    <p:tnLst>
+      <p:par>
+        <p:cTn id="1" dur="indefinite" restart="never" nodeType="tmRoot"/>
+      </p:par>
+    </p:tnLst>
+  </p:timing>
 </p:sld>
 </file>
 
@@ -10759,7 +11052,7 @@
           <p:cNvPr id="2" name="Title 1">
             <a:extLst>
               <a:ext uri="{FF2B5EF4-FFF2-40B4-BE49-F238E27FC236}">
-                <a16:creationId xmlns:a16="http://schemas.microsoft.com/office/drawing/2014/main" id="{6FBE7424-EC50-4430-9F7A-17BF5D5E911C}"/>
+                <a16:creationId xmlns:a16="http://schemas.microsoft.com/office/drawing/2014/main" id="{352CF587-1B3A-4E92-8FAC-F1FB018BC99E}"/>
               </a:ext>
             </a:extLst>
           </p:cNvPr>
@@ -10777,7 +11070,7 @@
           <a:p>
             <a:r>
               <a:rPr lang="en-US" dirty="0"/>
-              <a:t>Offline Viewing Option</a:t>
+              <a:t>Online Tableau Options</a:t>
             </a:r>
           </a:p>
         </p:txBody>
@@ -10787,7 +11080,7 @@
           <p:cNvPr id="3" name="Content Placeholder 2">
             <a:extLst>
               <a:ext uri="{FF2B5EF4-FFF2-40B4-BE49-F238E27FC236}">
-                <a16:creationId xmlns:a16="http://schemas.microsoft.com/office/drawing/2014/main" id="{42DA02A9-E41E-45F8-8466-D6B6B7520049}"/>
+                <a16:creationId xmlns:a16="http://schemas.microsoft.com/office/drawing/2014/main" id="{FD801550-CFFA-41C0-8B99-BB57DB502D2F}"/>
               </a:ext>
             </a:extLst>
           </p:cNvPr>
@@ -10805,42 +11098,103 @@
           <a:p>
             <a:r>
               <a:rPr lang="en-US" dirty="0"/>
-              <a:t>Tableau Reader</a:t>
+              <a:t>Tableau Online</a:t>
             </a:r>
           </a:p>
           <a:p>
             <a:pPr lvl="1"/>
             <a:r>
               <a:rPr lang="en-US" dirty="0"/>
-              <a:t>Free software</a:t>
+              <a:t>Online hosting of visualization via a paid service</a:t>
+            </a:r>
+          </a:p>
+          <a:p>
+            <a:r>
+              <a:rPr lang="en-US" dirty="0"/>
+              <a:t>Tableau Public</a:t>
             </a:r>
           </a:p>
           <a:p>
             <a:pPr lvl="1"/>
             <a:r>
               <a:rPr lang="en-US" dirty="0"/>
-              <a:t>Allows for users to view a Tableau visualization for free</a:t>
+              <a:t>Desktop client</a:t>
+            </a:r>
+          </a:p>
+          <a:p>
+            <a:pPr lvl="2"/>
+            <a:r>
+              <a:rPr lang="en-US" dirty="0"/>
+              <a:t>Desktop client has slightly restricted options</a:t>
             </a:r>
           </a:p>
           <a:p>
             <a:pPr lvl="1"/>
             <a:r>
               <a:rPr lang="en-US" dirty="0"/>
-              <a:t>Must have the file stored locally</a:t>
-            </a:r>
+              <a:t>Unlimited Online Publishing</a:t>
+            </a:r>
+          </a:p>
+          <a:p>
+            <a:pPr lvl="2"/>
+            <a:r>
+              <a:rPr lang="en-US" dirty="0"/>
+              <a:t>Must create and account</a:t>
+            </a:r>
+          </a:p>
+          <a:p>
+            <a:pPr lvl="2"/>
+            <a:r>
+              <a:rPr lang="en-US" dirty="0"/>
+              <a:t>Data must be an extract OR connected to an online, refreshable source</a:t>
+            </a:r>
+          </a:p>
+          <a:p>
+            <a:pPr lvl="2"/>
+            <a:r>
+              <a:rPr lang="en-US" b="1" dirty="0"/>
+              <a:t>NO PHI</a:t>
+            </a:r>
+            <a:endParaRPr lang="en-US" dirty="0"/>
+          </a:p>
+          <a:p>
+            <a:pPr lvl="2"/>
+            <a:r>
+              <a:rPr lang="en-US" b="1" dirty="0"/>
+              <a:t>You may allow others to download your workbook/data</a:t>
+            </a:r>
+            <a:endParaRPr lang="en-US" dirty="0"/>
+          </a:p>
+          <a:p>
+            <a:pPr lvl="2"/>
+            <a:r>
+              <a:rPr lang="en-US" dirty="0"/>
+              <a:t>Accessible via webpage/embedded</a:t>
+            </a:r>
+          </a:p>
+          <a:p>
+            <a:pPr lvl="1"/>
+            <a:endParaRPr lang="en-US" dirty="0"/>
           </a:p>
         </p:txBody>
       </p:sp>
     </p:spTree>
     <p:extLst>
       <p:ext uri="{BB962C8B-B14F-4D97-AF65-F5344CB8AC3E}">
-        <p14:creationId xmlns:p14="http://schemas.microsoft.com/office/powerpoint/2010/main" val="918893101"/>
+        <p14:creationId xmlns:p14="http://schemas.microsoft.com/office/powerpoint/2010/main" val="3453521001"/>
       </p:ext>
     </p:extLst>
   </p:cSld>
   <p:clrMapOvr>
     <a:masterClrMapping/>
   </p:clrMapOvr>
+  <p:timing>
+    <p:tnLst>
+      <p:par>
+        <p:cTn id="1" dur="indefinite" restart="never" nodeType="tmRoot"/>
+      </p:par>
+    </p:tnLst>
+  </p:timing>
 </p:sld>
 </file>
 
@@ -10866,6 +11220,120 @@
           <p:cNvPr id="2" name="Title 1">
             <a:extLst>
               <a:ext uri="{FF2B5EF4-FFF2-40B4-BE49-F238E27FC236}">
+                <a16:creationId xmlns:a16="http://schemas.microsoft.com/office/drawing/2014/main" id="{6FBE7424-EC50-4430-9F7A-17BF5D5E911C}"/>
+              </a:ext>
+            </a:extLst>
+          </p:cNvPr>
+          <p:cNvSpPr>
+            <a:spLocks noGrp="1"/>
+          </p:cNvSpPr>
+          <p:nvPr>
+            <p:ph type="title"/>
+          </p:nvPr>
+        </p:nvSpPr>
+        <p:spPr/>
+        <p:txBody>
+          <a:bodyPr/>
+          <a:lstStyle/>
+          <a:p>
+            <a:r>
+              <a:rPr lang="en-US" dirty="0"/>
+              <a:t>Offline Viewing Option</a:t>
+            </a:r>
+          </a:p>
+        </p:txBody>
+      </p:sp>
+      <p:sp>
+        <p:nvSpPr>
+          <p:cNvPr id="3" name="Content Placeholder 2">
+            <a:extLst>
+              <a:ext uri="{FF2B5EF4-FFF2-40B4-BE49-F238E27FC236}">
+                <a16:creationId xmlns:a16="http://schemas.microsoft.com/office/drawing/2014/main" id="{42DA02A9-E41E-45F8-8466-D6B6B7520049}"/>
+              </a:ext>
+            </a:extLst>
+          </p:cNvPr>
+          <p:cNvSpPr>
+            <a:spLocks noGrp="1"/>
+          </p:cNvSpPr>
+          <p:nvPr>
+            <p:ph idx="1"/>
+          </p:nvPr>
+        </p:nvSpPr>
+        <p:spPr/>
+        <p:txBody>
+          <a:bodyPr/>
+          <a:lstStyle/>
+          <a:p>
+            <a:r>
+              <a:rPr lang="en-US" dirty="0"/>
+              <a:t>Tableau Reader</a:t>
+            </a:r>
+          </a:p>
+          <a:p>
+            <a:pPr lvl="1"/>
+            <a:r>
+              <a:rPr lang="en-US" dirty="0"/>
+              <a:t>Free software</a:t>
+            </a:r>
+          </a:p>
+          <a:p>
+            <a:pPr lvl="1"/>
+            <a:r>
+              <a:rPr lang="en-US" dirty="0"/>
+              <a:t>Allows for users to view a Tableau visualization for free</a:t>
+            </a:r>
+          </a:p>
+          <a:p>
+            <a:pPr lvl="1"/>
+            <a:r>
+              <a:rPr lang="en-US" dirty="0"/>
+              <a:t>Must have the file stored locally</a:t>
+            </a:r>
+          </a:p>
+        </p:txBody>
+      </p:sp>
+    </p:spTree>
+    <p:extLst>
+      <p:ext uri="{BB962C8B-B14F-4D97-AF65-F5344CB8AC3E}">
+        <p14:creationId xmlns:p14="http://schemas.microsoft.com/office/powerpoint/2010/main" val="918893101"/>
+      </p:ext>
+    </p:extLst>
+  </p:cSld>
+  <p:clrMapOvr>
+    <a:masterClrMapping/>
+  </p:clrMapOvr>
+  <p:timing>
+    <p:tnLst>
+      <p:par>
+        <p:cTn id="1" dur="indefinite" restart="never" nodeType="tmRoot"/>
+      </p:par>
+    </p:tnLst>
+  </p:timing>
+</p:sld>
+</file>
+
+<file path=ppt/slides/slide32.xml><?xml version="1.0" encoding="utf-8"?>
+<p:sld xmlns:a="http://schemas.openxmlformats.org/drawingml/2006/main" xmlns:r="http://schemas.openxmlformats.org/officeDocument/2006/relationships" xmlns:p="http://schemas.openxmlformats.org/presentationml/2006/main">
+  <p:cSld>
+    <p:spTree>
+      <p:nvGrpSpPr>
+        <p:cNvPr id="1" name=""/>
+        <p:cNvGrpSpPr/>
+        <p:nvPr/>
+      </p:nvGrpSpPr>
+      <p:grpSpPr>
+        <a:xfrm>
+          <a:off x="0" y="0"/>
+          <a:ext cx="0" cy="0"/>
+          <a:chOff x="0" y="0"/>
+          <a:chExt cx="0" cy="0"/>
+        </a:xfrm>
+      </p:grpSpPr>
+      <p:sp>
+        <p:nvSpPr>
+          <p:cNvPr id="2" name="Title 1">
+            <a:extLst>
+              <a:ext uri="{FF2B5EF4-FFF2-40B4-BE49-F238E27FC236}">
                 <a16:creationId xmlns:a16="http://schemas.microsoft.com/office/drawing/2014/main" id="{5069936B-306B-4146-B8C6-A5C7596EECDC}"/>
               </a:ext>
             </a:extLst>
@@ -10935,16 +11403,21 @@
             </a:pPr>
             <a:r>
               <a:rPr lang="en-US" sz="3200" dirty="0"/>
-              <a:t>Publish to my account (or a </a:t>
-            </a:r>
-            <a:r>
-              <a:rPr lang="en-US" sz="3200" dirty="0" err="1"/>
+              <a:t>Publish </a:t>
+            </a:r>
+            <a:r>
+              <a:rPr lang="en-US" sz="3200" dirty="0" smtClean="0"/>
+              <a:t>to </a:t>
+            </a:r>
+            <a:r>
+              <a:rPr lang="en-US" sz="3200" dirty="0" err="1" smtClean="0"/>
               <a:t>BioDataClub</a:t>
             </a:r>
             <a:r>
-              <a:rPr lang="en-US" sz="3200" dirty="0"/>
-              <a:t> account?)</a:t>
-            </a:r>
+              <a:rPr lang="en-US" sz="3200" dirty="0" smtClean="0"/>
+              <a:t> account</a:t>
+            </a:r>
+            <a:endParaRPr lang="en-US" sz="3200" dirty="0"/>
           </a:p>
         </p:txBody>
       </p:sp>
@@ -10958,10 +11431,17 @@
   <p:clrMapOvr>
     <a:masterClrMapping/>
   </p:clrMapOvr>
+  <p:timing>
+    <p:tnLst>
+      <p:par>
+        <p:cTn id="1" dur="indefinite" restart="never" nodeType="tmRoot"/>
+      </p:par>
+    </p:tnLst>
+  </p:timing>
 </p:sld>
 </file>
 
-<file path=ppt/slides/slide32.xml><?xml version="1.0" encoding="utf-8"?>
+<file path=ppt/slides/slide33.xml><?xml version="1.0" encoding="utf-8"?>
 <p:sld xmlns:a="http://schemas.openxmlformats.org/drawingml/2006/main" xmlns:r="http://schemas.openxmlformats.org/officeDocument/2006/relationships" xmlns:p="http://schemas.openxmlformats.org/presentationml/2006/main">
   <p:cSld>
     <p:spTree>
@@ -11254,10 +11734,17 @@
   <p:clrMapOvr>
     <a:masterClrMapping/>
   </p:clrMapOvr>
+  <p:timing>
+    <p:tnLst>
+      <p:par>
+        <p:cTn id="1" dur="indefinite" restart="never" nodeType="tmRoot"/>
+      </p:par>
+    </p:tnLst>
+  </p:timing>
 </p:sld>
 </file>
 
-<file path=ppt/slides/slide33.xml><?xml version="1.0" encoding="utf-8"?>
+<file path=ppt/slides/slide34.xml><?xml version="1.0" encoding="utf-8"?>
 <p:sld xmlns:a="http://schemas.openxmlformats.org/drawingml/2006/main" xmlns:r="http://schemas.openxmlformats.org/officeDocument/2006/relationships" xmlns:p="http://schemas.openxmlformats.org/presentationml/2006/main">
   <p:cSld>
     <p:spTree>
@@ -12706,10 +13193,17 @@
   <p:clrMapOvr>
     <a:masterClrMapping/>
   </p:clrMapOvr>
+  <p:timing>
+    <p:tnLst>
+      <p:par>
+        <p:cTn id="1" dur="indefinite" restart="never" nodeType="tmRoot"/>
+      </p:par>
+    </p:tnLst>
+  </p:timing>
 </p:sld>
 </file>
 
-<file path=ppt/slides/slide34.xml><?xml version="1.0" encoding="utf-8"?>
+<file path=ppt/slides/slide35.xml><?xml version="1.0" encoding="utf-8"?>
 <p:sld xmlns:a="http://schemas.openxmlformats.org/drawingml/2006/main" xmlns:r="http://schemas.openxmlformats.org/officeDocument/2006/relationships" xmlns:p="http://schemas.openxmlformats.org/presentationml/2006/main">
   <p:cSld>
     <p:spTree>
@@ -12821,8 +13315,13 @@
             <a:pPr lvl="1"/>
             <a:r>
               <a:rPr lang="en-US" sz="2400" dirty="0"/>
-              <a:t>Included with Creator, Academic Licenses</a:t>
-            </a:r>
+              <a:t>Included with </a:t>
+            </a:r>
+            <a:r>
+              <a:rPr lang="en-US" sz="2400" dirty="0" smtClean="0"/>
+              <a:t>Academic</a:t>
+            </a:r>
+            <a:endParaRPr lang="en-US" sz="2400" dirty="0"/>
           </a:p>
           <a:p>
             <a:pPr lvl="1"/>
@@ -12867,10 +13366,17 @@
   <p:clrMapOvr>
     <a:masterClrMapping/>
   </p:clrMapOvr>
+  <p:timing>
+    <p:tnLst>
+      <p:par>
+        <p:cTn id="1" dur="indefinite" restart="never" nodeType="tmRoot"/>
+      </p:par>
+    </p:tnLst>
+  </p:timing>
 </p:sld>
 </file>
 
-<file path=ppt/slides/slide35.xml><?xml version="1.0" encoding="utf-8"?>
+<file path=ppt/slides/slide36.xml><?xml version="1.0" encoding="utf-8"?>
 <p:sld xmlns:a="http://schemas.openxmlformats.org/drawingml/2006/main" xmlns:r="http://schemas.openxmlformats.org/officeDocument/2006/relationships" xmlns:p="http://schemas.openxmlformats.org/presentationml/2006/main">
   <p:cSld>
     <p:spTree>
@@ -12984,135 +13490,13 @@
   <p:clrMapOvr>
     <a:masterClrMapping/>
   </p:clrMapOvr>
-</p:sld>
-</file>
-
-<file path=ppt/slides/slide36.xml><?xml version="1.0" encoding="utf-8"?>
-<p:sld xmlns:a="http://schemas.openxmlformats.org/drawingml/2006/main" xmlns:r="http://schemas.openxmlformats.org/officeDocument/2006/relationships" xmlns:p="http://schemas.openxmlformats.org/presentationml/2006/main">
-  <p:cSld>
-    <p:spTree>
-      <p:nvGrpSpPr>
-        <p:cNvPr id="1" name=""/>
-        <p:cNvGrpSpPr/>
-        <p:nvPr/>
-      </p:nvGrpSpPr>
-      <p:grpSpPr>
-        <a:xfrm>
-          <a:off x="0" y="0"/>
-          <a:ext cx="0" cy="0"/>
-          <a:chOff x="0" y="0"/>
-          <a:chExt cx="0" cy="0"/>
-        </a:xfrm>
-      </p:grpSpPr>
-      <p:sp>
-        <p:nvSpPr>
-          <p:cNvPr id="2" name="Title 1">
-            <a:extLst>
-              <a:ext uri="{FF2B5EF4-FFF2-40B4-BE49-F238E27FC236}">
-                <a16:creationId xmlns:a16="http://schemas.microsoft.com/office/drawing/2014/main" id="{75B1E6AA-52B4-43A0-A4F3-5700CED263FD}"/>
-              </a:ext>
-            </a:extLst>
-          </p:cNvPr>
-          <p:cNvSpPr>
-            <a:spLocks noGrp="1"/>
-          </p:cNvSpPr>
-          <p:nvPr>
-            <p:ph type="title"/>
-          </p:nvPr>
-        </p:nvSpPr>
-        <p:spPr/>
-        <p:txBody>
-          <a:bodyPr/>
-          <a:lstStyle/>
-          <a:p>
-            <a:r>
-              <a:rPr lang="en-US" b="1" dirty="0">
-                <a:solidFill>
-                  <a:schemeClr val="accent1"/>
-                </a:solidFill>
-              </a:rPr>
-              <a:t>Advanced</a:t>
-            </a:r>
-            <a:r>
-              <a:rPr lang="en-US" dirty="0"/>
-              <a:t>: Tableau Desktop Extensions</a:t>
-            </a:r>
-          </a:p>
-        </p:txBody>
-      </p:sp>
-      <p:sp>
-        <p:nvSpPr>
-          <p:cNvPr id="3" name="Content Placeholder 2">
-            <a:extLst>
-              <a:ext uri="{FF2B5EF4-FFF2-40B4-BE49-F238E27FC236}">
-                <a16:creationId xmlns:a16="http://schemas.microsoft.com/office/drawing/2014/main" id="{F139AC24-107F-4F70-ABEC-C912C521CF07}"/>
-              </a:ext>
-            </a:extLst>
-          </p:cNvPr>
-          <p:cNvSpPr>
-            <a:spLocks noGrp="1"/>
-          </p:cNvSpPr>
-          <p:nvPr>
-            <p:ph idx="1"/>
-          </p:nvPr>
-        </p:nvSpPr>
-        <p:spPr/>
-        <p:txBody>
-          <a:bodyPr/>
-          <a:lstStyle/>
-          <a:p>
-            <a:r>
-              <a:rPr lang="en-US" dirty="0"/>
-              <a:t>Allow for custom coding for additional functionality</a:t>
-            </a:r>
-          </a:p>
-          <a:p>
-            <a:r>
-              <a:rPr lang="en-US" dirty="0"/>
-              <a:t>Relatively new (still in Beta)</a:t>
-            </a:r>
-          </a:p>
-          <a:p>
-            <a:r>
-              <a:rPr lang="en-US" dirty="0"/>
-              <a:t>Require connection to Web Services</a:t>
-            </a:r>
-          </a:p>
-          <a:p>
-            <a:pPr lvl="1"/>
-            <a:r>
-              <a:rPr lang="en-US" dirty="0"/>
-              <a:t>Extension is essentially a window to the web</a:t>
-            </a:r>
-          </a:p>
-          <a:p>
-            <a:pPr lvl="1"/>
-            <a:r>
-              <a:rPr lang="en-US" dirty="0">
-                <a:hlinkClick r:id="rId2"/>
-              </a:rPr>
-              <a:t>https://extensiongallery.tableau.com/</a:t>
-            </a:r>
-            <a:endParaRPr lang="en-US" dirty="0"/>
-          </a:p>
-          <a:p>
-            <a:r>
-              <a:rPr lang="en-US" i="1" dirty="0"/>
-              <a:t>Currently disabled in Tableau Public</a:t>
-            </a:r>
-          </a:p>
-        </p:txBody>
-      </p:sp>
-    </p:spTree>
-    <p:extLst>
-      <p:ext uri="{BB962C8B-B14F-4D97-AF65-F5344CB8AC3E}">
-        <p14:creationId xmlns:p14="http://schemas.microsoft.com/office/powerpoint/2010/main" val="2941885592"/>
-      </p:ext>
-    </p:extLst>
-  </p:cSld>
-  <p:clrMapOvr>
-    <a:masterClrMapping/>
-  </p:clrMapOvr>
+  <p:timing>
+    <p:tnLst>
+      <p:par>
+        <p:cTn id="1" dur="indefinite" restart="never" nodeType="tmRoot"/>
+      </p:par>
+    </p:tnLst>
+  </p:timing>
 </p:sld>
 </file>
 
@@ -13164,6 +13548,144 @@
             </a:r>
             <a:r>
               <a:rPr lang="en-US" dirty="0"/>
+              <a:t>: Tableau Desktop Extensions</a:t>
+            </a:r>
+          </a:p>
+        </p:txBody>
+      </p:sp>
+      <p:sp>
+        <p:nvSpPr>
+          <p:cNvPr id="3" name="Content Placeholder 2">
+            <a:extLst>
+              <a:ext uri="{FF2B5EF4-FFF2-40B4-BE49-F238E27FC236}">
+                <a16:creationId xmlns:a16="http://schemas.microsoft.com/office/drawing/2014/main" id="{F139AC24-107F-4F70-ABEC-C912C521CF07}"/>
+              </a:ext>
+            </a:extLst>
+          </p:cNvPr>
+          <p:cNvSpPr>
+            <a:spLocks noGrp="1"/>
+          </p:cNvSpPr>
+          <p:nvPr>
+            <p:ph idx="1"/>
+          </p:nvPr>
+        </p:nvSpPr>
+        <p:spPr/>
+        <p:txBody>
+          <a:bodyPr>
+            <a:normAutofit/>
+          </a:bodyPr>
+          <a:lstStyle/>
+          <a:p>
+            <a:r>
+              <a:rPr lang="en-US" sz="2800" dirty="0"/>
+              <a:t>Allow for custom coding for additional functionality</a:t>
+            </a:r>
+          </a:p>
+          <a:p>
+            <a:r>
+              <a:rPr lang="en-US" sz="2800" dirty="0"/>
+              <a:t>Relatively new (still in Beta)</a:t>
+            </a:r>
+          </a:p>
+          <a:p>
+            <a:r>
+              <a:rPr lang="en-US" sz="2800" dirty="0"/>
+              <a:t>Require connection to Web Services</a:t>
+            </a:r>
+          </a:p>
+          <a:p>
+            <a:pPr lvl="1"/>
+            <a:r>
+              <a:rPr lang="en-US" sz="2400" dirty="0"/>
+              <a:t>Extension is essentially a window to the web</a:t>
+            </a:r>
+          </a:p>
+          <a:p>
+            <a:pPr lvl="1"/>
+            <a:r>
+              <a:rPr lang="en-US" sz="2400" dirty="0">
+                <a:hlinkClick r:id="rId2"/>
+              </a:rPr>
+              <a:t>https://extensiongallery.tableau.com/</a:t>
+            </a:r>
+            <a:endParaRPr lang="en-US" sz="2400" dirty="0"/>
+          </a:p>
+          <a:p>
+            <a:r>
+              <a:rPr lang="en-US" sz="2800" i="1" dirty="0"/>
+              <a:t>Currently disabled in Tableau Public</a:t>
+            </a:r>
+          </a:p>
+        </p:txBody>
+      </p:sp>
+    </p:spTree>
+    <p:extLst>
+      <p:ext uri="{BB962C8B-B14F-4D97-AF65-F5344CB8AC3E}">
+        <p14:creationId xmlns:p14="http://schemas.microsoft.com/office/powerpoint/2010/main" val="2941885592"/>
+      </p:ext>
+    </p:extLst>
+  </p:cSld>
+  <p:clrMapOvr>
+    <a:masterClrMapping/>
+  </p:clrMapOvr>
+  <p:timing>
+    <p:tnLst>
+      <p:par>
+        <p:cTn id="1" dur="indefinite" restart="never" nodeType="tmRoot"/>
+      </p:par>
+    </p:tnLst>
+  </p:timing>
+</p:sld>
+</file>
+
+<file path=ppt/slides/slide38.xml><?xml version="1.0" encoding="utf-8"?>
+<p:sld xmlns:a="http://schemas.openxmlformats.org/drawingml/2006/main" xmlns:r="http://schemas.openxmlformats.org/officeDocument/2006/relationships" xmlns:p="http://schemas.openxmlformats.org/presentationml/2006/main">
+  <p:cSld>
+    <p:spTree>
+      <p:nvGrpSpPr>
+        <p:cNvPr id="1" name=""/>
+        <p:cNvGrpSpPr/>
+        <p:nvPr/>
+      </p:nvGrpSpPr>
+      <p:grpSpPr>
+        <a:xfrm>
+          <a:off x="0" y="0"/>
+          <a:ext cx="0" cy="0"/>
+          <a:chOff x="0" y="0"/>
+          <a:chExt cx="0" cy="0"/>
+        </a:xfrm>
+      </p:grpSpPr>
+      <p:sp>
+        <p:nvSpPr>
+          <p:cNvPr id="2" name="Title 1">
+            <a:extLst>
+              <a:ext uri="{FF2B5EF4-FFF2-40B4-BE49-F238E27FC236}">
+                <a16:creationId xmlns:a16="http://schemas.microsoft.com/office/drawing/2014/main" id="{75B1E6AA-52B4-43A0-A4F3-5700CED263FD}"/>
+              </a:ext>
+            </a:extLst>
+          </p:cNvPr>
+          <p:cNvSpPr>
+            <a:spLocks noGrp="1"/>
+          </p:cNvSpPr>
+          <p:nvPr>
+            <p:ph type="title"/>
+          </p:nvPr>
+        </p:nvSpPr>
+        <p:spPr/>
+        <p:txBody>
+          <a:bodyPr/>
+          <a:lstStyle/>
+          <a:p>
+            <a:r>
+              <a:rPr lang="en-US" b="1" dirty="0">
+                <a:solidFill>
+                  <a:schemeClr val="accent1"/>
+                </a:solidFill>
+              </a:rPr>
+              <a:t>Advanced</a:t>
+            </a:r>
+            <a:r>
+              <a:rPr lang="en-US" dirty="0"/>
               <a:t>: Tableau and Big Data</a:t>
             </a:r>
           </a:p>
@@ -13226,10 +13748,17 @@
   <p:clrMapOvr>
     <a:masterClrMapping/>
   </p:clrMapOvr>
+  <p:timing>
+    <p:tnLst>
+      <p:par>
+        <p:cTn id="1" dur="indefinite" restart="never" nodeType="tmRoot"/>
+      </p:par>
+    </p:tnLst>
+  </p:timing>
 </p:sld>
 </file>
 
-<file path=ppt/slides/slide38.xml><?xml version="1.0" encoding="utf-8"?>
+<file path=ppt/slides/slide39.xml><?xml version="1.0" encoding="utf-8"?>
 <p:sld xmlns:a="http://schemas.openxmlformats.org/drawingml/2006/main" xmlns:r="http://schemas.openxmlformats.org/officeDocument/2006/relationships" xmlns:p="http://schemas.openxmlformats.org/presentationml/2006/main">
   <p:cSld>
     <p:spTree>

</xml_diff>